<commit_message>
Created new example .Rmd
</commit_message>
<xml_diff>
--- a/Version Control.pptx
+++ b/Version Control.pptx
@@ -10,6 +10,7 @@
     <p:sldId id="258" r:id="rId4"/>
     <p:sldId id="259" r:id="rId5"/>
     <p:sldId id="260" r:id="rId6"/>
+    <p:sldId id="261" r:id="rId7"/>
   </p:sldIdLst>
   <p:sldSz cx="12192000" cy="6858000"/>
   <p:notesSz cx="6858000" cy="9144000"/>
@@ -5425,6 +5426,232 @@
 </p:sld>
 </file>
 
+<file path=ppt/slides/slide6.xml><?xml version="1.0" encoding="utf-8"?>
+<p:sld xmlns:a="http://schemas.openxmlformats.org/drawingml/2006/main" xmlns:r="http://schemas.openxmlformats.org/officeDocument/2006/relationships" xmlns:p="http://schemas.openxmlformats.org/presentationml/2006/main">
+  <p:cSld>
+    <p:spTree>
+      <p:nvGrpSpPr>
+        <p:cNvPr id="1" name=""/>
+        <p:cNvGrpSpPr/>
+        <p:nvPr/>
+      </p:nvGrpSpPr>
+      <p:grpSpPr>
+        <a:xfrm>
+          <a:off x="0" y="0"/>
+          <a:ext cx="0" cy="0"/>
+          <a:chOff x="0" y="0"/>
+          <a:chExt cx="0" cy="0"/>
+        </a:xfrm>
+      </p:grpSpPr>
+      <p:pic>
+        <p:nvPicPr>
+          <p:cNvPr id="3" name="Picture 2" descr="A screenshot of a social media post&#10;&#10;Description automatically generated">
+            <a:extLst>
+              <a:ext uri="{FF2B5EF4-FFF2-40B4-BE49-F238E27FC236}">
+                <a16:creationId xmlns:a16="http://schemas.microsoft.com/office/drawing/2014/main" id="{F7D57E74-A759-364F-B53A-F4AB0795C21C}"/>
+              </a:ext>
+            </a:extLst>
+          </p:cNvPr>
+          <p:cNvPicPr>
+            <a:picLocks noChangeAspect="1"/>
+          </p:cNvPicPr>
+          <p:nvPr/>
+        </p:nvPicPr>
+        <p:blipFill rotWithShape="1">
+          <a:blip r:embed="rId2"/>
+          <a:srcRect r="65463" b="72004"/>
+          <a:stretch/>
+        </p:blipFill>
+        <p:spPr>
+          <a:xfrm>
+            <a:off x="1724800" y="1663662"/>
+            <a:ext cx="7362756" cy="3032516"/>
+          </a:xfrm>
+          <a:prstGeom prst="rect">
+            <a:avLst/>
+          </a:prstGeom>
+        </p:spPr>
+      </p:pic>
+      <p:sp>
+        <p:nvSpPr>
+          <p:cNvPr id="9" name="TextBox 8">
+            <a:extLst>
+              <a:ext uri="{FF2B5EF4-FFF2-40B4-BE49-F238E27FC236}">
+                <a16:creationId xmlns:a16="http://schemas.microsoft.com/office/drawing/2014/main" id="{6ED3CA6B-04A3-1845-9F89-F53483506F54}"/>
+              </a:ext>
+            </a:extLst>
+          </p:cNvPr>
+          <p:cNvSpPr txBox="1"/>
+          <p:nvPr/>
+        </p:nvSpPr>
+        <p:spPr>
+          <a:xfrm>
+            <a:off x="5068710" y="4431618"/>
+            <a:ext cx="1986845" cy="369332"/>
+          </a:xfrm>
+          <a:prstGeom prst="rect">
+            <a:avLst/>
+          </a:prstGeom>
+          <a:solidFill>
+            <a:schemeClr val="bg2"/>
+          </a:solidFill>
+          <a:ln>
+            <a:solidFill>
+              <a:schemeClr val="accent1"/>
+            </a:solidFill>
+          </a:ln>
+        </p:spPr>
+        <p:txBody>
+          <a:bodyPr wrap="square" rtlCol="0">
+            <a:spAutoFit/>
+          </a:bodyPr>
+          <a:lstStyle/>
+          <a:p>
+            <a:r>
+              <a:rPr lang="en-US" dirty="0"/>
+              <a:t>Add a new line</a:t>
+            </a:r>
+          </a:p>
+        </p:txBody>
+      </p:sp>
+      <p:cxnSp>
+        <p:nvCxnSpPr>
+          <p:cNvPr id="11" name="Straight Arrow Connector 10">
+            <a:extLst>
+              <a:ext uri="{FF2B5EF4-FFF2-40B4-BE49-F238E27FC236}">
+                <a16:creationId xmlns:a16="http://schemas.microsoft.com/office/drawing/2014/main" id="{B859BF7B-3A60-5243-9E25-C6418513574C}"/>
+              </a:ext>
+            </a:extLst>
+          </p:cNvPr>
+          <p:cNvCxnSpPr>
+            <a:stCxn id="9" idx="1"/>
+          </p:cNvCxnSpPr>
+          <p:nvPr/>
+        </p:nvCxnSpPr>
+        <p:spPr>
+          <a:xfrm flipH="1" flipV="1">
+            <a:off x="4255911" y="4097867"/>
+            <a:ext cx="812799" cy="518417"/>
+          </a:xfrm>
+          <a:prstGeom prst="straightConnector1">
+            <a:avLst/>
+          </a:prstGeom>
+          <a:ln w="19050">
+            <a:tailEnd type="triangle"/>
+          </a:ln>
+        </p:spPr>
+        <p:style>
+          <a:lnRef idx="1">
+            <a:schemeClr val="accent1"/>
+          </a:lnRef>
+          <a:fillRef idx="0">
+            <a:schemeClr val="accent1"/>
+          </a:fillRef>
+          <a:effectRef idx="0">
+            <a:schemeClr val="accent1"/>
+          </a:effectRef>
+          <a:fontRef idx="minor">
+            <a:schemeClr val="tx1"/>
+          </a:fontRef>
+        </p:style>
+      </p:cxnSp>
+      <p:sp>
+        <p:nvSpPr>
+          <p:cNvPr id="12" name="TextBox 11">
+            <a:extLst>
+              <a:ext uri="{FF2B5EF4-FFF2-40B4-BE49-F238E27FC236}">
+                <a16:creationId xmlns:a16="http://schemas.microsoft.com/office/drawing/2014/main" id="{E9AB4D5E-5053-1949-9F45-4787C7983E54}"/>
+              </a:ext>
+            </a:extLst>
+          </p:cNvPr>
+          <p:cNvSpPr txBox="1"/>
+          <p:nvPr/>
+        </p:nvSpPr>
+        <p:spPr>
+          <a:xfrm>
+            <a:off x="666044" y="2123039"/>
+            <a:ext cx="993423" cy="369332"/>
+          </a:xfrm>
+          <a:prstGeom prst="rect">
+            <a:avLst/>
+          </a:prstGeom>
+          <a:solidFill>
+            <a:schemeClr val="bg2"/>
+          </a:solidFill>
+          <a:ln>
+            <a:solidFill>
+              <a:schemeClr val="accent1"/>
+            </a:solidFill>
+          </a:ln>
+        </p:spPr>
+        <p:txBody>
+          <a:bodyPr wrap="square" rtlCol="0">
+            <a:spAutoFit/>
+          </a:bodyPr>
+          <a:lstStyle/>
+          <a:p>
+            <a:r>
+              <a:rPr lang="en-US" dirty="0"/>
+              <a:t>Save</a:t>
+            </a:r>
+          </a:p>
+        </p:txBody>
+      </p:sp>
+      <p:cxnSp>
+        <p:nvCxnSpPr>
+          <p:cNvPr id="13" name="Straight Arrow Connector 12">
+            <a:extLst>
+              <a:ext uri="{FF2B5EF4-FFF2-40B4-BE49-F238E27FC236}">
+                <a16:creationId xmlns:a16="http://schemas.microsoft.com/office/drawing/2014/main" id="{C242D9DD-4E16-0741-9F6B-02DB38D380CE}"/>
+              </a:ext>
+            </a:extLst>
+          </p:cNvPr>
+          <p:cNvCxnSpPr>
+            <a:cxnSpLocks/>
+            <a:stCxn id="12" idx="3"/>
+          </p:cNvCxnSpPr>
+          <p:nvPr/>
+        </p:nvCxnSpPr>
+        <p:spPr>
+          <a:xfrm>
+            <a:off x="1659467" y="2307705"/>
+            <a:ext cx="1399822" cy="254873"/>
+          </a:xfrm>
+          <a:prstGeom prst="straightConnector1">
+            <a:avLst/>
+          </a:prstGeom>
+          <a:ln w="19050">
+            <a:tailEnd type="triangle"/>
+          </a:ln>
+        </p:spPr>
+        <p:style>
+          <a:lnRef idx="1">
+            <a:schemeClr val="accent1"/>
+          </a:lnRef>
+          <a:fillRef idx="0">
+            <a:schemeClr val="accent1"/>
+          </a:fillRef>
+          <a:effectRef idx="0">
+            <a:schemeClr val="accent1"/>
+          </a:effectRef>
+          <a:fontRef idx="minor">
+            <a:schemeClr val="tx1"/>
+          </a:fontRef>
+        </p:style>
+      </p:cxnSp>
+    </p:spTree>
+    <p:extLst>
+      <p:ext uri="{BB962C8B-B14F-4D97-AF65-F5344CB8AC3E}">
+        <p14:creationId xmlns:p14="http://schemas.microsoft.com/office/powerpoint/2010/main" val="1308526186"/>
+      </p:ext>
+    </p:extLst>
+  </p:cSld>
+  <p:clrMapOvr>
+    <a:masterClrMapping/>
+  </p:clrMapOvr>
+</p:sld>
+</file>
+
 <file path=ppt/theme/theme1.xml><?xml version="1.0" encoding="utf-8"?>
 <a:theme xmlns:a="http://schemas.openxmlformats.org/drawingml/2006/main" name="Office Theme">
   <a:themeElements>

</xml_diff>

<commit_message>
Upload raw data to GitHub
</commit_message>
<xml_diff>
--- a/Version Control.pptx
+++ b/Version Control.pptx
@@ -11,6 +11,14 @@
     <p:sldId id="259" r:id="rId5"/>
     <p:sldId id="260" r:id="rId6"/>
     <p:sldId id="261" r:id="rId7"/>
+    <p:sldId id="262" r:id="rId8"/>
+    <p:sldId id="263" r:id="rId9"/>
+    <p:sldId id="264" r:id="rId10"/>
+    <p:sldId id="265" r:id="rId11"/>
+    <p:sldId id="266" r:id="rId12"/>
+    <p:sldId id="267" r:id="rId13"/>
+    <p:sldId id="268" r:id="rId14"/>
+    <p:sldId id="269" r:id="rId15"/>
   </p:sldIdLst>
   <p:sldSz cx="12192000" cy="6858000"/>
   <p:notesSz cx="6858000" cy="9144000"/>
@@ -3549,6 +3557,1544 @@
     <p:extLst>
       <p:ext uri="{BB962C8B-B14F-4D97-AF65-F5344CB8AC3E}">
         <p14:creationId xmlns:p14="http://schemas.microsoft.com/office/powerpoint/2010/main" val="1993150976"/>
+      </p:ext>
+    </p:extLst>
+  </p:cSld>
+  <p:clrMapOvr>
+    <a:masterClrMapping/>
+  </p:clrMapOvr>
+</p:sld>
+</file>
+
+<file path=ppt/slides/slide10.xml><?xml version="1.0" encoding="utf-8"?>
+<p:sld xmlns:a="http://schemas.openxmlformats.org/drawingml/2006/main" xmlns:r="http://schemas.openxmlformats.org/officeDocument/2006/relationships" xmlns:p="http://schemas.openxmlformats.org/presentationml/2006/main">
+  <p:cSld>
+    <p:spTree>
+      <p:nvGrpSpPr>
+        <p:cNvPr id="1" name=""/>
+        <p:cNvGrpSpPr/>
+        <p:nvPr/>
+      </p:nvGrpSpPr>
+      <p:grpSpPr>
+        <a:xfrm>
+          <a:off x="0" y="0"/>
+          <a:ext cx="0" cy="0"/>
+          <a:chOff x="0" y="0"/>
+          <a:chExt cx="0" cy="0"/>
+        </a:xfrm>
+      </p:grpSpPr>
+      <p:pic>
+        <p:nvPicPr>
+          <p:cNvPr id="3" name="Picture 2" descr="A screenshot of a social media post&#10;&#10;Description automatically generated">
+            <a:extLst>
+              <a:ext uri="{FF2B5EF4-FFF2-40B4-BE49-F238E27FC236}">
+                <a16:creationId xmlns:a16="http://schemas.microsoft.com/office/drawing/2014/main" id="{119096DF-DBEE-A64E-981A-E35B3C7D6396}"/>
+              </a:ext>
+            </a:extLst>
+          </p:cNvPr>
+          <p:cNvPicPr>
+            <a:picLocks noChangeAspect="1"/>
+          </p:cNvPicPr>
+          <p:nvPr/>
+        </p:nvPicPr>
+        <p:blipFill>
+          <a:blip r:embed="rId2"/>
+          <a:stretch>
+            <a:fillRect/>
+          </a:stretch>
+        </p:blipFill>
+        <p:spPr>
+          <a:xfrm>
+            <a:off x="2209800" y="44450"/>
+            <a:ext cx="7772400" cy="6769100"/>
+          </a:xfrm>
+          <a:prstGeom prst="rect">
+            <a:avLst/>
+          </a:prstGeom>
+        </p:spPr>
+      </p:pic>
+      <p:sp>
+        <p:nvSpPr>
+          <p:cNvPr id="4" name="Rectangle 3">
+            <a:extLst>
+              <a:ext uri="{FF2B5EF4-FFF2-40B4-BE49-F238E27FC236}">
+                <a16:creationId xmlns:a16="http://schemas.microsoft.com/office/drawing/2014/main" id="{6A3033C4-F621-1C41-8C53-97BD0F5BBDE0}"/>
+              </a:ext>
+            </a:extLst>
+          </p:cNvPr>
+          <p:cNvSpPr/>
+          <p:nvPr/>
+        </p:nvSpPr>
+        <p:spPr>
+          <a:xfrm>
+            <a:off x="2381956" y="1535289"/>
+            <a:ext cx="7461955" cy="1998133"/>
+          </a:xfrm>
+          <a:prstGeom prst="rect">
+            <a:avLst/>
+          </a:prstGeom>
+          <a:solidFill>
+            <a:srgbClr val="FCF7E8"/>
+          </a:solidFill>
+          <a:ln>
+            <a:noFill/>
+          </a:ln>
+        </p:spPr>
+        <p:style>
+          <a:lnRef idx="2">
+            <a:schemeClr val="accent1">
+              <a:shade val="50000"/>
+            </a:schemeClr>
+          </a:lnRef>
+          <a:fillRef idx="1">
+            <a:schemeClr val="accent1"/>
+          </a:fillRef>
+          <a:effectRef idx="0">
+            <a:schemeClr val="accent1"/>
+          </a:effectRef>
+          <a:fontRef idx="minor">
+            <a:schemeClr val="lt1"/>
+          </a:fontRef>
+        </p:style>
+        <p:txBody>
+          <a:bodyPr rtlCol="0" anchor="ctr"/>
+          <a:lstStyle/>
+          <a:p>
+            <a:pPr algn="ctr"/>
+            <a:endParaRPr lang="en-US"/>
+          </a:p>
+        </p:txBody>
+      </p:sp>
+      <p:sp>
+        <p:nvSpPr>
+          <p:cNvPr id="5" name="Rectangle 4">
+            <a:extLst>
+              <a:ext uri="{FF2B5EF4-FFF2-40B4-BE49-F238E27FC236}">
+                <a16:creationId xmlns:a16="http://schemas.microsoft.com/office/drawing/2014/main" id="{1BA1B771-3FCF-7E4D-B84D-FFD0159E313C}"/>
+              </a:ext>
+            </a:extLst>
+          </p:cNvPr>
+          <p:cNvSpPr/>
+          <p:nvPr/>
+        </p:nvSpPr>
+        <p:spPr>
+          <a:xfrm>
+            <a:off x="2376312" y="4097867"/>
+            <a:ext cx="7461955" cy="1625600"/>
+          </a:xfrm>
+          <a:prstGeom prst="rect">
+            <a:avLst/>
+          </a:prstGeom>
+          <a:solidFill>
+            <a:srgbClr val="FCF7E8"/>
+          </a:solidFill>
+          <a:ln>
+            <a:noFill/>
+          </a:ln>
+        </p:spPr>
+        <p:style>
+          <a:lnRef idx="2">
+            <a:schemeClr val="accent1">
+              <a:shade val="50000"/>
+            </a:schemeClr>
+          </a:lnRef>
+          <a:fillRef idx="1">
+            <a:schemeClr val="accent1"/>
+          </a:fillRef>
+          <a:effectRef idx="0">
+            <a:schemeClr val="accent1"/>
+          </a:effectRef>
+          <a:fontRef idx="minor">
+            <a:schemeClr val="lt1"/>
+          </a:fontRef>
+        </p:style>
+        <p:txBody>
+          <a:bodyPr rtlCol="0" anchor="ctr"/>
+          <a:lstStyle/>
+          <a:p>
+            <a:pPr algn="ctr"/>
+            <a:endParaRPr lang="en-US"/>
+          </a:p>
+        </p:txBody>
+      </p:sp>
+      <p:sp>
+        <p:nvSpPr>
+          <p:cNvPr id="6" name="Rectangle 5">
+            <a:extLst>
+              <a:ext uri="{FF2B5EF4-FFF2-40B4-BE49-F238E27FC236}">
+                <a16:creationId xmlns:a16="http://schemas.microsoft.com/office/drawing/2014/main" id="{201CE553-518B-324B-8F2F-FCAD052ECEAC}"/>
+              </a:ext>
+            </a:extLst>
+          </p:cNvPr>
+          <p:cNvSpPr/>
+          <p:nvPr/>
+        </p:nvSpPr>
+        <p:spPr>
+          <a:xfrm>
+            <a:off x="7473245" y="3544709"/>
+            <a:ext cx="1444977" cy="225779"/>
+          </a:xfrm>
+          <a:prstGeom prst="rect">
+            <a:avLst/>
+          </a:prstGeom>
+          <a:solidFill>
+            <a:srgbClr val="FCF7E8"/>
+          </a:solidFill>
+          <a:ln>
+            <a:noFill/>
+          </a:ln>
+        </p:spPr>
+        <p:style>
+          <a:lnRef idx="2">
+            <a:schemeClr val="accent1">
+              <a:shade val="50000"/>
+            </a:schemeClr>
+          </a:lnRef>
+          <a:fillRef idx="1">
+            <a:schemeClr val="accent1"/>
+          </a:fillRef>
+          <a:effectRef idx="0">
+            <a:schemeClr val="accent1"/>
+          </a:effectRef>
+          <a:fontRef idx="minor">
+            <a:schemeClr val="lt1"/>
+          </a:fontRef>
+        </p:style>
+        <p:txBody>
+          <a:bodyPr rtlCol="0" anchor="ctr"/>
+          <a:lstStyle/>
+          <a:p>
+            <a:pPr algn="r"/>
+            <a:r>
+              <a:rPr lang="en-US" sz="1600" dirty="0">
+                <a:solidFill>
+                  <a:schemeClr val="bg2">
+                    <a:lumMod val="50000"/>
+                  </a:schemeClr>
+                </a:solidFill>
+              </a:rPr>
+              <a:t>Jun 17, 2020,</a:t>
+            </a:r>
+          </a:p>
+        </p:txBody>
+      </p:sp>
+      <p:sp>
+        <p:nvSpPr>
+          <p:cNvPr id="7" name="Rectangle 6">
+            <a:extLst>
+              <a:ext uri="{FF2B5EF4-FFF2-40B4-BE49-F238E27FC236}">
+                <a16:creationId xmlns:a16="http://schemas.microsoft.com/office/drawing/2014/main" id="{46056CD9-9010-CD41-B96C-093DD70DC9DB}"/>
+              </a:ext>
+            </a:extLst>
+          </p:cNvPr>
+          <p:cNvSpPr/>
+          <p:nvPr/>
+        </p:nvSpPr>
+        <p:spPr>
+          <a:xfrm>
+            <a:off x="7478889" y="3855153"/>
+            <a:ext cx="1444977" cy="225779"/>
+          </a:xfrm>
+          <a:prstGeom prst="rect">
+            <a:avLst/>
+          </a:prstGeom>
+          <a:solidFill>
+            <a:srgbClr val="FCF7E8"/>
+          </a:solidFill>
+          <a:ln>
+            <a:noFill/>
+          </a:ln>
+        </p:spPr>
+        <p:style>
+          <a:lnRef idx="2">
+            <a:schemeClr val="accent1">
+              <a:shade val="50000"/>
+            </a:schemeClr>
+          </a:lnRef>
+          <a:fillRef idx="1">
+            <a:schemeClr val="accent1"/>
+          </a:fillRef>
+          <a:effectRef idx="0">
+            <a:schemeClr val="accent1"/>
+          </a:effectRef>
+          <a:fontRef idx="minor">
+            <a:schemeClr val="lt1"/>
+          </a:fontRef>
+        </p:style>
+        <p:txBody>
+          <a:bodyPr rtlCol="0" anchor="ctr"/>
+          <a:lstStyle/>
+          <a:p>
+            <a:pPr algn="r"/>
+            <a:r>
+              <a:rPr lang="en-US" sz="1600" dirty="0">
+                <a:solidFill>
+                  <a:schemeClr val="bg2">
+                    <a:lumMod val="50000"/>
+                  </a:schemeClr>
+                </a:solidFill>
+              </a:rPr>
+              <a:t>Jun 17, 2020,</a:t>
+            </a:r>
+          </a:p>
+        </p:txBody>
+      </p:sp>
+      <p:sp>
+        <p:nvSpPr>
+          <p:cNvPr id="8" name="Rectangle 7">
+            <a:extLst>
+              <a:ext uri="{FF2B5EF4-FFF2-40B4-BE49-F238E27FC236}">
+                <a16:creationId xmlns:a16="http://schemas.microsoft.com/office/drawing/2014/main" id="{55A024B2-24BD-9C44-A029-F975159290D5}"/>
+              </a:ext>
+            </a:extLst>
+          </p:cNvPr>
+          <p:cNvSpPr/>
+          <p:nvPr/>
+        </p:nvSpPr>
+        <p:spPr>
+          <a:xfrm>
+            <a:off x="7456311" y="5762975"/>
+            <a:ext cx="1444977" cy="225779"/>
+          </a:xfrm>
+          <a:prstGeom prst="rect">
+            <a:avLst/>
+          </a:prstGeom>
+          <a:solidFill>
+            <a:srgbClr val="FCF7E8"/>
+          </a:solidFill>
+          <a:ln>
+            <a:noFill/>
+          </a:ln>
+        </p:spPr>
+        <p:style>
+          <a:lnRef idx="2">
+            <a:schemeClr val="accent1">
+              <a:shade val="50000"/>
+            </a:schemeClr>
+          </a:lnRef>
+          <a:fillRef idx="1">
+            <a:schemeClr val="accent1"/>
+          </a:fillRef>
+          <a:effectRef idx="0">
+            <a:schemeClr val="accent1"/>
+          </a:effectRef>
+          <a:fontRef idx="minor">
+            <a:schemeClr val="lt1"/>
+          </a:fontRef>
+        </p:style>
+        <p:txBody>
+          <a:bodyPr rtlCol="0" anchor="ctr"/>
+          <a:lstStyle/>
+          <a:p>
+            <a:pPr algn="r"/>
+            <a:r>
+              <a:rPr lang="en-US" sz="1600" dirty="0">
+                <a:solidFill>
+                  <a:schemeClr val="bg2">
+                    <a:lumMod val="50000"/>
+                  </a:schemeClr>
+                </a:solidFill>
+              </a:rPr>
+              <a:t>Jun 17, 2020,</a:t>
+            </a:r>
+          </a:p>
+        </p:txBody>
+      </p:sp>
+      <p:sp>
+        <p:nvSpPr>
+          <p:cNvPr id="9" name="TextBox 8">
+            <a:extLst>
+              <a:ext uri="{FF2B5EF4-FFF2-40B4-BE49-F238E27FC236}">
+                <a16:creationId xmlns:a16="http://schemas.microsoft.com/office/drawing/2014/main" id="{B2F57329-C17E-424A-93EA-DA6CFDE9CC80}"/>
+              </a:ext>
+            </a:extLst>
+          </p:cNvPr>
+          <p:cNvSpPr txBox="1"/>
+          <p:nvPr/>
+        </p:nvSpPr>
+        <p:spPr>
+          <a:xfrm>
+            <a:off x="1309510" y="4623529"/>
+            <a:ext cx="2641601" cy="369332"/>
+          </a:xfrm>
+          <a:prstGeom prst="rect">
+            <a:avLst/>
+          </a:prstGeom>
+          <a:solidFill>
+            <a:schemeClr val="bg2"/>
+          </a:solidFill>
+          <a:ln>
+            <a:solidFill>
+              <a:schemeClr val="accent1"/>
+            </a:solidFill>
+          </a:ln>
+        </p:spPr>
+        <p:txBody>
+          <a:bodyPr wrap="square" rtlCol="0">
+            <a:spAutoFit/>
+          </a:bodyPr>
+          <a:lstStyle/>
+          <a:p>
+            <a:r>
+              <a:rPr lang="en-US" dirty="0"/>
+              <a:t>Here’s the new document</a:t>
+            </a:r>
+          </a:p>
+        </p:txBody>
+      </p:sp>
+      <p:cxnSp>
+        <p:nvCxnSpPr>
+          <p:cNvPr id="11" name="Straight Arrow Connector 10">
+            <a:extLst>
+              <a:ext uri="{FF2B5EF4-FFF2-40B4-BE49-F238E27FC236}">
+                <a16:creationId xmlns:a16="http://schemas.microsoft.com/office/drawing/2014/main" id="{C800CCEC-325B-9648-824C-F7BC00CB1F0D}"/>
+              </a:ext>
+            </a:extLst>
+          </p:cNvPr>
+          <p:cNvCxnSpPr/>
+          <p:nvPr/>
+        </p:nvCxnSpPr>
+        <p:spPr>
+          <a:xfrm>
+            <a:off x="2630311" y="5000978"/>
+            <a:ext cx="790222" cy="688622"/>
+          </a:xfrm>
+          <a:prstGeom prst="straightConnector1">
+            <a:avLst/>
+          </a:prstGeom>
+          <a:ln w="19050">
+            <a:tailEnd type="triangle"/>
+          </a:ln>
+        </p:spPr>
+        <p:style>
+          <a:lnRef idx="1">
+            <a:schemeClr val="accent1"/>
+          </a:lnRef>
+          <a:fillRef idx="0">
+            <a:schemeClr val="accent1"/>
+          </a:fillRef>
+          <a:effectRef idx="0">
+            <a:schemeClr val="accent1"/>
+          </a:effectRef>
+          <a:fontRef idx="minor">
+            <a:schemeClr val="tx1"/>
+          </a:fontRef>
+        </p:style>
+      </p:cxnSp>
+    </p:spTree>
+    <p:extLst>
+      <p:ext uri="{BB962C8B-B14F-4D97-AF65-F5344CB8AC3E}">
+        <p14:creationId xmlns:p14="http://schemas.microsoft.com/office/powerpoint/2010/main" val="1683749224"/>
+      </p:ext>
+    </p:extLst>
+  </p:cSld>
+  <p:clrMapOvr>
+    <a:masterClrMapping/>
+  </p:clrMapOvr>
+</p:sld>
+</file>
+
+<file path=ppt/slides/slide11.xml><?xml version="1.0" encoding="utf-8"?>
+<p:sld xmlns:a="http://schemas.openxmlformats.org/drawingml/2006/main" xmlns:r="http://schemas.openxmlformats.org/officeDocument/2006/relationships" xmlns:p="http://schemas.openxmlformats.org/presentationml/2006/main">
+  <p:cSld>
+    <p:spTree>
+      <p:nvGrpSpPr>
+        <p:cNvPr id="1" name=""/>
+        <p:cNvGrpSpPr/>
+        <p:nvPr/>
+      </p:nvGrpSpPr>
+      <p:grpSpPr>
+        <a:xfrm>
+          <a:off x="0" y="0"/>
+          <a:ext cx="0" cy="0"/>
+          <a:chOff x="0" y="0"/>
+          <a:chExt cx="0" cy="0"/>
+        </a:xfrm>
+      </p:grpSpPr>
+      <p:pic>
+        <p:nvPicPr>
+          <p:cNvPr id="4" name="Picture 3" descr="A screenshot of a social media post&#10;&#10;Description automatically generated">
+            <a:extLst>
+              <a:ext uri="{FF2B5EF4-FFF2-40B4-BE49-F238E27FC236}">
+                <a16:creationId xmlns:a16="http://schemas.microsoft.com/office/drawing/2014/main" id="{7F590802-2953-AA48-A611-B22B59870218}"/>
+              </a:ext>
+            </a:extLst>
+          </p:cNvPr>
+          <p:cNvPicPr>
+            <a:picLocks noChangeAspect="1"/>
+          </p:cNvPicPr>
+          <p:nvPr/>
+        </p:nvPicPr>
+        <p:blipFill>
+          <a:blip r:embed="rId2"/>
+          <a:stretch>
+            <a:fillRect/>
+          </a:stretch>
+        </p:blipFill>
+        <p:spPr>
+          <a:xfrm>
+            <a:off x="187678" y="291394"/>
+            <a:ext cx="8674100" cy="4561187"/>
+          </a:xfrm>
+          <a:prstGeom prst="rect">
+            <a:avLst/>
+          </a:prstGeom>
+        </p:spPr>
+      </p:pic>
+      <p:sp>
+        <p:nvSpPr>
+          <p:cNvPr id="5" name="TextBox 4">
+            <a:extLst>
+              <a:ext uri="{FF2B5EF4-FFF2-40B4-BE49-F238E27FC236}">
+                <a16:creationId xmlns:a16="http://schemas.microsoft.com/office/drawing/2014/main" id="{B8433707-D53E-3F4A-B4CF-4B44E971480D}"/>
+              </a:ext>
+            </a:extLst>
+          </p:cNvPr>
+          <p:cNvSpPr txBox="1"/>
+          <p:nvPr/>
+        </p:nvSpPr>
+        <p:spPr>
+          <a:xfrm>
+            <a:off x="2585155" y="2015796"/>
+            <a:ext cx="2641601" cy="1477328"/>
+          </a:xfrm>
+          <a:prstGeom prst="rect">
+            <a:avLst/>
+          </a:prstGeom>
+          <a:solidFill>
+            <a:schemeClr val="bg2"/>
+          </a:solidFill>
+          <a:ln>
+            <a:solidFill>
+              <a:schemeClr val="accent1"/>
+            </a:solidFill>
+          </a:ln>
+        </p:spPr>
+        <p:txBody>
+          <a:bodyPr wrap="square" rtlCol="0">
+            <a:spAutoFit/>
+          </a:bodyPr>
+          <a:lstStyle/>
+          <a:p>
+            <a:r>
+              <a:rPr lang="en-US" dirty="0"/>
+              <a:t>This functions gives us the file pathway for our working directory (i.e., where this </a:t>
+            </a:r>
+            <a:r>
+              <a:rPr lang="en-US" dirty="0" err="1"/>
+              <a:t>RMarkdown</a:t>
+            </a:r>
+            <a:r>
+              <a:rPr lang="en-US" dirty="0"/>
+              <a:t> file is saved</a:t>
+            </a:r>
+          </a:p>
+        </p:txBody>
+      </p:sp>
+      <p:cxnSp>
+        <p:nvCxnSpPr>
+          <p:cNvPr id="7" name="Straight Arrow Connector 6">
+            <a:extLst>
+              <a:ext uri="{FF2B5EF4-FFF2-40B4-BE49-F238E27FC236}">
+                <a16:creationId xmlns:a16="http://schemas.microsoft.com/office/drawing/2014/main" id="{112C0200-66C1-ED45-BAAD-EE222E49781A}"/>
+              </a:ext>
+            </a:extLst>
+          </p:cNvPr>
+          <p:cNvCxnSpPr>
+            <a:stCxn id="5" idx="1"/>
+          </p:cNvCxnSpPr>
+          <p:nvPr/>
+        </p:nvCxnSpPr>
+        <p:spPr>
+          <a:xfrm flipH="1">
+            <a:off x="1501422" y="2754460"/>
+            <a:ext cx="1083733" cy="880562"/>
+          </a:xfrm>
+          <a:prstGeom prst="straightConnector1">
+            <a:avLst/>
+          </a:prstGeom>
+          <a:ln w="19050">
+            <a:tailEnd type="triangle"/>
+          </a:ln>
+        </p:spPr>
+        <p:style>
+          <a:lnRef idx="1">
+            <a:schemeClr val="accent1"/>
+          </a:lnRef>
+          <a:fillRef idx="0">
+            <a:schemeClr val="accent1"/>
+          </a:fillRef>
+          <a:effectRef idx="0">
+            <a:schemeClr val="accent1"/>
+          </a:effectRef>
+          <a:fontRef idx="minor">
+            <a:schemeClr val="tx1"/>
+          </a:fontRef>
+        </p:style>
+      </p:cxnSp>
+      <p:sp>
+        <p:nvSpPr>
+          <p:cNvPr id="8" name="TextBox 7">
+            <a:extLst>
+              <a:ext uri="{FF2B5EF4-FFF2-40B4-BE49-F238E27FC236}">
+                <a16:creationId xmlns:a16="http://schemas.microsoft.com/office/drawing/2014/main" id="{0C87F2C6-0866-3241-9A37-7701C19E11D0}"/>
+              </a:ext>
+            </a:extLst>
+          </p:cNvPr>
+          <p:cNvSpPr txBox="1"/>
+          <p:nvPr/>
+        </p:nvSpPr>
+        <p:spPr>
+          <a:xfrm>
+            <a:off x="254001" y="5272640"/>
+            <a:ext cx="2641601" cy="923330"/>
+          </a:xfrm>
+          <a:prstGeom prst="rect">
+            <a:avLst/>
+          </a:prstGeom>
+          <a:solidFill>
+            <a:schemeClr val="bg2"/>
+          </a:solidFill>
+          <a:ln>
+            <a:solidFill>
+              <a:schemeClr val="accent1"/>
+            </a:solidFill>
+          </a:ln>
+        </p:spPr>
+        <p:txBody>
+          <a:bodyPr wrap="square" rtlCol="0">
+            <a:spAutoFit/>
+          </a:bodyPr>
+          <a:lstStyle/>
+          <a:p>
+            <a:r>
+              <a:rPr lang="en-US" dirty="0"/>
+              <a:t>Since we created new folders within this directory/folder…</a:t>
+            </a:r>
+          </a:p>
+        </p:txBody>
+      </p:sp>
+      <p:cxnSp>
+        <p:nvCxnSpPr>
+          <p:cNvPr id="10" name="Straight Arrow Connector 9">
+            <a:extLst>
+              <a:ext uri="{FF2B5EF4-FFF2-40B4-BE49-F238E27FC236}">
+                <a16:creationId xmlns:a16="http://schemas.microsoft.com/office/drawing/2014/main" id="{264F15A2-4B7F-9742-B302-2949B0CA5E28}"/>
+              </a:ext>
+            </a:extLst>
+          </p:cNvPr>
+          <p:cNvCxnSpPr>
+            <a:cxnSpLocks/>
+          </p:cNvCxnSpPr>
+          <p:nvPr/>
+        </p:nvCxnSpPr>
+        <p:spPr>
+          <a:xfrm flipV="1">
+            <a:off x="2918179" y="4967111"/>
+            <a:ext cx="1010354" cy="790952"/>
+          </a:xfrm>
+          <a:prstGeom prst="straightConnector1">
+            <a:avLst/>
+          </a:prstGeom>
+          <a:ln w="19050">
+            <a:tailEnd type="triangle"/>
+          </a:ln>
+        </p:spPr>
+        <p:style>
+          <a:lnRef idx="1">
+            <a:schemeClr val="accent1"/>
+          </a:lnRef>
+          <a:fillRef idx="0">
+            <a:schemeClr val="accent1"/>
+          </a:fillRef>
+          <a:effectRef idx="0">
+            <a:schemeClr val="accent1"/>
+          </a:effectRef>
+          <a:fontRef idx="minor">
+            <a:schemeClr val="tx1"/>
+          </a:fontRef>
+        </p:style>
+      </p:cxnSp>
+      <p:sp>
+        <p:nvSpPr>
+          <p:cNvPr id="11" name="Left Brace 10">
+            <a:extLst>
+              <a:ext uri="{FF2B5EF4-FFF2-40B4-BE49-F238E27FC236}">
+                <a16:creationId xmlns:a16="http://schemas.microsoft.com/office/drawing/2014/main" id="{3D90592C-2DCF-B343-AF6E-CC289F5362F9}"/>
+              </a:ext>
+            </a:extLst>
+          </p:cNvPr>
+          <p:cNvSpPr/>
+          <p:nvPr/>
+        </p:nvSpPr>
+        <p:spPr>
+          <a:xfrm rot="16200000">
+            <a:off x="3838226" y="3826932"/>
+            <a:ext cx="327378" cy="1840091"/>
+          </a:xfrm>
+          <a:prstGeom prst="leftBrace">
+            <a:avLst/>
+          </a:prstGeom>
+          <a:ln w="19050"/>
+        </p:spPr>
+        <p:style>
+          <a:lnRef idx="1">
+            <a:schemeClr val="accent1"/>
+          </a:lnRef>
+          <a:fillRef idx="0">
+            <a:schemeClr val="accent1"/>
+          </a:fillRef>
+          <a:effectRef idx="0">
+            <a:schemeClr val="accent1"/>
+          </a:effectRef>
+          <a:fontRef idx="minor">
+            <a:schemeClr val="tx1"/>
+          </a:fontRef>
+        </p:style>
+        <p:txBody>
+          <a:bodyPr rtlCol="0" anchor="ctr"/>
+          <a:lstStyle/>
+          <a:p>
+            <a:pPr algn="ctr"/>
+            <a:endParaRPr lang="en-US"/>
+          </a:p>
+        </p:txBody>
+      </p:sp>
+      <p:sp>
+        <p:nvSpPr>
+          <p:cNvPr id="14" name="TextBox 13">
+            <a:extLst>
+              <a:ext uri="{FF2B5EF4-FFF2-40B4-BE49-F238E27FC236}">
+                <a16:creationId xmlns:a16="http://schemas.microsoft.com/office/drawing/2014/main" id="{EC2AADF8-3ADA-1F4B-A47F-0AAC9BE9E0EE}"/>
+              </a:ext>
+            </a:extLst>
+          </p:cNvPr>
+          <p:cNvSpPr txBox="1"/>
+          <p:nvPr/>
+        </p:nvSpPr>
+        <p:spPr>
+          <a:xfrm>
+            <a:off x="3826934" y="5278284"/>
+            <a:ext cx="2641601" cy="923330"/>
+          </a:xfrm>
+          <a:prstGeom prst="rect">
+            <a:avLst/>
+          </a:prstGeom>
+          <a:solidFill>
+            <a:schemeClr val="bg2"/>
+          </a:solidFill>
+          <a:ln>
+            <a:solidFill>
+              <a:schemeClr val="accent1"/>
+            </a:solidFill>
+          </a:ln>
+        </p:spPr>
+        <p:txBody>
+          <a:bodyPr wrap="square" rtlCol="0">
+            <a:spAutoFit/>
+          </a:bodyPr>
+          <a:lstStyle/>
+          <a:p>
+            <a:r>
+              <a:rPr lang="en-US" dirty="0"/>
+              <a:t>We know that the pathways of the new folders are:</a:t>
+            </a:r>
+          </a:p>
+        </p:txBody>
+      </p:sp>
+      <p:sp>
+        <p:nvSpPr>
+          <p:cNvPr id="15" name="Right Arrow 14">
+            <a:extLst>
+              <a:ext uri="{FF2B5EF4-FFF2-40B4-BE49-F238E27FC236}">
+                <a16:creationId xmlns:a16="http://schemas.microsoft.com/office/drawing/2014/main" id="{392B1907-0F71-9443-8911-AFC9EA9FD2A5}"/>
+              </a:ext>
+            </a:extLst>
+          </p:cNvPr>
+          <p:cNvSpPr/>
+          <p:nvPr/>
+        </p:nvSpPr>
+        <p:spPr>
+          <a:xfrm>
+            <a:off x="3048000" y="5757333"/>
+            <a:ext cx="620889" cy="203200"/>
+          </a:xfrm>
+          <a:prstGeom prst="rightArrow">
+            <a:avLst/>
+          </a:prstGeom>
+        </p:spPr>
+        <p:style>
+          <a:lnRef idx="2">
+            <a:schemeClr val="accent1">
+              <a:shade val="50000"/>
+            </a:schemeClr>
+          </a:lnRef>
+          <a:fillRef idx="1">
+            <a:schemeClr val="accent1"/>
+          </a:fillRef>
+          <a:effectRef idx="0">
+            <a:schemeClr val="accent1"/>
+          </a:effectRef>
+          <a:fontRef idx="minor">
+            <a:schemeClr val="lt1"/>
+          </a:fontRef>
+        </p:style>
+        <p:txBody>
+          <a:bodyPr rtlCol="0" anchor="ctr"/>
+          <a:lstStyle/>
+          <a:p>
+            <a:pPr algn="ctr"/>
+            <a:endParaRPr lang="en-US"/>
+          </a:p>
+        </p:txBody>
+      </p:sp>
+      <p:sp>
+        <p:nvSpPr>
+          <p:cNvPr id="16" name="TextBox 15">
+            <a:extLst>
+              <a:ext uri="{FF2B5EF4-FFF2-40B4-BE49-F238E27FC236}">
+                <a16:creationId xmlns:a16="http://schemas.microsoft.com/office/drawing/2014/main" id="{11041D42-0193-8740-9FEF-E05B62E536A8}"/>
+              </a:ext>
+            </a:extLst>
+          </p:cNvPr>
+          <p:cNvSpPr txBox="1"/>
+          <p:nvPr/>
+        </p:nvSpPr>
+        <p:spPr>
+          <a:xfrm>
+            <a:off x="6649156" y="4990418"/>
+            <a:ext cx="5542844" cy="461665"/>
+          </a:xfrm>
+          <a:prstGeom prst="rect">
+            <a:avLst/>
+          </a:prstGeom>
+          <a:solidFill>
+            <a:schemeClr val="bg2"/>
+          </a:solidFill>
+          <a:ln>
+            <a:solidFill>
+              <a:schemeClr val="accent1"/>
+            </a:solidFill>
+          </a:ln>
+        </p:spPr>
+        <p:txBody>
+          <a:bodyPr wrap="square" rtlCol="0">
+            <a:spAutoFit/>
+          </a:bodyPr>
+          <a:lstStyle/>
+          <a:p>
+            <a:r>
+              <a:rPr lang="en-US" sz="1200" dirty="0"/>
+              <a:t>"/Users/</a:t>
+            </a:r>
+            <a:r>
+              <a:rPr lang="en-US" sz="1200" dirty="0" err="1"/>
+              <a:t>victoriafield</a:t>
+            </a:r>
+            <a:r>
+              <a:rPr lang="en-US" sz="1200" dirty="0"/>
+              <a:t>/Library/Mobile Documents/</a:t>
+            </a:r>
+            <a:r>
+              <a:rPr lang="en-US" sz="1200" dirty="0" err="1"/>
+              <a:t>com~apple~CloudDocs</a:t>
+            </a:r>
+            <a:r>
+              <a:rPr lang="en-US" sz="1200" dirty="0"/>
+              <a:t>/Summer Work/Training Documents/Training Development/</a:t>
+            </a:r>
+            <a:r>
+              <a:rPr lang="en-US" sz="1200" dirty="0" err="1"/>
+              <a:t>data_raw</a:t>
+            </a:r>
+            <a:r>
+              <a:rPr lang="en-US" sz="1200" dirty="0"/>
+              <a:t>"</a:t>
+            </a:r>
+          </a:p>
+        </p:txBody>
+      </p:sp>
+      <p:sp>
+        <p:nvSpPr>
+          <p:cNvPr id="17" name="TextBox 16">
+            <a:extLst>
+              <a:ext uri="{FF2B5EF4-FFF2-40B4-BE49-F238E27FC236}">
+                <a16:creationId xmlns:a16="http://schemas.microsoft.com/office/drawing/2014/main" id="{9DDB00EA-EF7E-0E47-ACA9-AAEBE2559D8D}"/>
+              </a:ext>
+            </a:extLst>
+          </p:cNvPr>
+          <p:cNvSpPr txBox="1"/>
+          <p:nvPr/>
+        </p:nvSpPr>
+        <p:spPr>
+          <a:xfrm>
+            <a:off x="6649156" y="5515351"/>
+            <a:ext cx="5542844" cy="461665"/>
+          </a:xfrm>
+          <a:prstGeom prst="rect">
+            <a:avLst/>
+          </a:prstGeom>
+          <a:solidFill>
+            <a:schemeClr val="bg2"/>
+          </a:solidFill>
+          <a:ln>
+            <a:solidFill>
+              <a:schemeClr val="accent1"/>
+            </a:solidFill>
+          </a:ln>
+        </p:spPr>
+        <p:txBody>
+          <a:bodyPr wrap="square" rtlCol="0">
+            <a:spAutoFit/>
+          </a:bodyPr>
+          <a:lstStyle/>
+          <a:p>
+            <a:r>
+              <a:rPr lang="en-US" sz="1200" dirty="0"/>
+              <a:t>"/Users/</a:t>
+            </a:r>
+            <a:r>
+              <a:rPr lang="en-US" sz="1200" dirty="0" err="1"/>
+              <a:t>victoriafield</a:t>
+            </a:r>
+            <a:r>
+              <a:rPr lang="en-US" sz="1200" dirty="0"/>
+              <a:t>/Library/Mobile Documents/</a:t>
+            </a:r>
+            <a:r>
+              <a:rPr lang="en-US" sz="1200" dirty="0" err="1"/>
+              <a:t>com~apple~CloudDocs</a:t>
+            </a:r>
+            <a:r>
+              <a:rPr lang="en-US" sz="1200" dirty="0"/>
+              <a:t>/Summer Work/Training Documents/Training Development/</a:t>
+            </a:r>
+            <a:r>
+              <a:rPr lang="en-US" sz="1200" dirty="0" err="1"/>
+              <a:t>data_processed</a:t>
+            </a:r>
+            <a:r>
+              <a:rPr lang="en-US" sz="1200" dirty="0"/>
+              <a:t>"</a:t>
+            </a:r>
+          </a:p>
+        </p:txBody>
+      </p:sp>
+      <p:sp>
+        <p:nvSpPr>
+          <p:cNvPr id="18" name="TextBox 17">
+            <a:extLst>
+              <a:ext uri="{FF2B5EF4-FFF2-40B4-BE49-F238E27FC236}">
+                <a16:creationId xmlns:a16="http://schemas.microsoft.com/office/drawing/2014/main" id="{A9F89772-C5C2-B342-93B4-927A4E9C2EA7}"/>
+              </a:ext>
+            </a:extLst>
+          </p:cNvPr>
+          <p:cNvSpPr txBox="1"/>
+          <p:nvPr/>
+        </p:nvSpPr>
+        <p:spPr>
+          <a:xfrm>
+            <a:off x="6649156" y="6023352"/>
+            <a:ext cx="5542844" cy="461665"/>
+          </a:xfrm>
+          <a:prstGeom prst="rect">
+            <a:avLst/>
+          </a:prstGeom>
+          <a:solidFill>
+            <a:schemeClr val="bg2"/>
+          </a:solidFill>
+          <a:ln>
+            <a:solidFill>
+              <a:schemeClr val="accent1"/>
+            </a:solidFill>
+          </a:ln>
+        </p:spPr>
+        <p:txBody>
+          <a:bodyPr wrap="square" rtlCol="0">
+            <a:spAutoFit/>
+          </a:bodyPr>
+          <a:lstStyle/>
+          <a:p>
+            <a:r>
+              <a:rPr lang="en-US" sz="1200" dirty="0"/>
+              <a:t>"/Users/</a:t>
+            </a:r>
+            <a:r>
+              <a:rPr lang="en-US" sz="1200" dirty="0" err="1"/>
+              <a:t>victoriafield</a:t>
+            </a:r>
+            <a:r>
+              <a:rPr lang="en-US" sz="1200" dirty="0"/>
+              <a:t>/Library/Mobile Documents/</a:t>
+            </a:r>
+            <a:r>
+              <a:rPr lang="en-US" sz="1200" dirty="0" err="1"/>
+              <a:t>com~apple~CloudDocs</a:t>
+            </a:r>
+            <a:r>
+              <a:rPr lang="en-US" sz="1200" dirty="0"/>
+              <a:t>/Summer Work/Training Documents/Training Development/</a:t>
+            </a:r>
+            <a:r>
+              <a:rPr lang="en-US" sz="1200" dirty="0" err="1"/>
+              <a:t>output_images</a:t>
+            </a:r>
+            <a:r>
+              <a:rPr lang="en-US" sz="1200" dirty="0"/>
+              <a:t>"</a:t>
+            </a:r>
+          </a:p>
+        </p:txBody>
+      </p:sp>
+    </p:spTree>
+    <p:extLst>
+      <p:ext uri="{BB962C8B-B14F-4D97-AF65-F5344CB8AC3E}">
+        <p14:creationId xmlns:p14="http://schemas.microsoft.com/office/powerpoint/2010/main" val="1734641932"/>
+      </p:ext>
+    </p:extLst>
+  </p:cSld>
+  <p:clrMapOvr>
+    <a:masterClrMapping/>
+  </p:clrMapOvr>
+</p:sld>
+</file>
+
+<file path=ppt/slides/slide12.xml><?xml version="1.0" encoding="utf-8"?>
+<p:sld xmlns:a="http://schemas.openxmlformats.org/drawingml/2006/main" xmlns:r="http://schemas.openxmlformats.org/officeDocument/2006/relationships" xmlns:p="http://schemas.openxmlformats.org/presentationml/2006/main">
+  <p:cSld>
+    <p:spTree>
+      <p:nvGrpSpPr>
+        <p:cNvPr id="1" name=""/>
+        <p:cNvGrpSpPr/>
+        <p:nvPr/>
+      </p:nvGrpSpPr>
+      <p:grpSpPr>
+        <a:xfrm>
+          <a:off x="0" y="0"/>
+          <a:ext cx="0" cy="0"/>
+          <a:chOff x="0" y="0"/>
+          <a:chExt cx="0" cy="0"/>
+        </a:xfrm>
+      </p:grpSpPr>
+      <p:pic>
+        <p:nvPicPr>
+          <p:cNvPr id="3" name="Picture 2" descr="A screenshot of a cell phone&#10;&#10;Description automatically generated">
+            <a:extLst>
+              <a:ext uri="{FF2B5EF4-FFF2-40B4-BE49-F238E27FC236}">
+                <a16:creationId xmlns:a16="http://schemas.microsoft.com/office/drawing/2014/main" id="{56B47F25-F68A-BE4A-8EA5-A13C351F15E1}"/>
+              </a:ext>
+            </a:extLst>
+          </p:cNvPr>
+          <p:cNvPicPr>
+            <a:picLocks noChangeAspect="1"/>
+          </p:cNvPicPr>
+          <p:nvPr/>
+        </p:nvPicPr>
+        <p:blipFill>
+          <a:blip r:embed="rId2"/>
+          <a:stretch>
+            <a:fillRect/>
+          </a:stretch>
+        </p:blipFill>
+        <p:spPr>
+          <a:xfrm>
+            <a:off x="2770716" y="389467"/>
+            <a:ext cx="7531100" cy="6146800"/>
+          </a:xfrm>
+          <a:prstGeom prst="rect">
+            <a:avLst/>
+          </a:prstGeom>
+        </p:spPr>
+      </p:pic>
+      <p:sp>
+        <p:nvSpPr>
+          <p:cNvPr id="4" name="TextBox 3">
+            <a:extLst>
+              <a:ext uri="{FF2B5EF4-FFF2-40B4-BE49-F238E27FC236}">
+                <a16:creationId xmlns:a16="http://schemas.microsoft.com/office/drawing/2014/main" id="{CE828605-6954-5E43-8A72-6BBDA8AC374A}"/>
+              </a:ext>
+            </a:extLst>
+          </p:cNvPr>
+          <p:cNvSpPr txBox="1"/>
+          <p:nvPr/>
+        </p:nvSpPr>
+        <p:spPr>
+          <a:xfrm>
+            <a:off x="7332135" y="4617884"/>
+            <a:ext cx="2641601" cy="369332"/>
+          </a:xfrm>
+          <a:prstGeom prst="rect">
+            <a:avLst/>
+          </a:prstGeom>
+          <a:solidFill>
+            <a:schemeClr val="bg2"/>
+          </a:solidFill>
+          <a:ln>
+            <a:solidFill>
+              <a:schemeClr val="accent1"/>
+            </a:solidFill>
+          </a:ln>
+        </p:spPr>
+        <p:txBody>
+          <a:bodyPr wrap="square" rtlCol="0">
+            <a:spAutoFit/>
+          </a:bodyPr>
+          <a:lstStyle/>
+          <a:p>
+            <a:r>
+              <a:rPr lang="en-US" dirty="0"/>
+              <a:t>Error thrown</a:t>
+            </a:r>
+          </a:p>
+        </p:txBody>
+      </p:sp>
+    </p:spTree>
+    <p:extLst>
+      <p:ext uri="{BB962C8B-B14F-4D97-AF65-F5344CB8AC3E}">
+        <p14:creationId xmlns:p14="http://schemas.microsoft.com/office/powerpoint/2010/main" val="3439645561"/>
+      </p:ext>
+    </p:extLst>
+  </p:cSld>
+  <p:clrMapOvr>
+    <a:masterClrMapping/>
+  </p:clrMapOvr>
+</p:sld>
+</file>
+
+<file path=ppt/slides/slide13.xml><?xml version="1.0" encoding="utf-8"?>
+<p:sld xmlns:a="http://schemas.openxmlformats.org/drawingml/2006/main" xmlns:r="http://schemas.openxmlformats.org/officeDocument/2006/relationships" xmlns:p="http://schemas.openxmlformats.org/presentationml/2006/main">
+  <p:cSld>
+    <p:spTree>
+      <p:nvGrpSpPr>
+        <p:cNvPr id="1" name=""/>
+        <p:cNvGrpSpPr/>
+        <p:nvPr/>
+      </p:nvGrpSpPr>
+      <p:grpSpPr>
+        <a:xfrm>
+          <a:off x="0" y="0"/>
+          <a:ext cx="0" cy="0"/>
+          <a:chOff x="0" y="0"/>
+          <a:chExt cx="0" cy="0"/>
+        </a:xfrm>
+      </p:grpSpPr>
+      <p:pic>
+        <p:nvPicPr>
+          <p:cNvPr id="3" name="Picture 2" descr="A screenshot of a social media post&#10;&#10;Description automatically generated">
+            <a:extLst>
+              <a:ext uri="{FF2B5EF4-FFF2-40B4-BE49-F238E27FC236}">
+                <a16:creationId xmlns:a16="http://schemas.microsoft.com/office/drawing/2014/main" id="{98D9892F-4D63-A341-95D6-2FACD8A91133}"/>
+              </a:ext>
+            </a:extLst>
+          </p:cNvPr>
+          <p:cNvPicPr>
+            <a:picLocks noChangeAspect="1"/>
+          </p:cNvPicPr>
+          <p:nvPr/>
+        </p:nvPicPr>
+        <p:blipFill rotWithShape="1">
+          <a:blip r:embed="rId2"/>
+          <a:srcRect r="40092"/>
+          <a:stretch/>
+        </p:blipFill>
+        <p:spPr>
+          <a:xfrm>
+            <a:off x="0" y="0"/>
+            <a:ext cx="7303911" cy="4162224"/>
+          </a:xfrm>
+          <a:prstGeom prst="rect">
+            <a:avLst/>
+          </a:prstGeom>
+        </p:spPr>
+      </p:pic>
+      <p:sp>
+        <p:nvSpPr>
+          <p:cNvPr id="4" name="TextBox 3">
+            <a:extLst>
+              <a:ext uri="{FF2B5EF4-FFF2-40B4-BE49-F238E27FC236}">
+                <a16:creationId xmlns:a16="http://schemas.microsoft.com/office/drawing/2014/main" id="{AB2D251D-AE39-0340-8E04-5281C5FBA3D0}"/>
+              </a:ext>
+            </a:extLst>
+          </p:cNvPr>
+          <p:cNvSpPr txBox="1"/>
+          <p:nvPr/>
+        </p:nvSpPr>
+        <p:spPr>
+          <a:xfrm>
+            <a:off x="1360313" y="4471129"/>
+            <a:ext cx="2641601" cy="1200329"/>
+          </a:xfrm>
+          <a:prstGeom prst="rect">
+            <a:avLst/>
+          </a:prstGeom>
+          <a:solidFill>
+            <a:schemeClr val="bg2"/>
+          </a:solidFill>
+          <a:ln>
+            <a:solidFill>
+              <a:schemeClr val="accent1"/>
+            </a:solidFill>
+          </a:ln>
+        </p:spPr>
+        <p:txBody>
+          <a:bodyPr wrap="square" rtlCol="0">
+            <a:spAutoFit/>
+          </a:bodyPr>
+          <a:lstStyle/>
+          <a:p>
+            <a:r>
+              <a:rPr lang="en-US" dirty="0"/>
+              <a:t>By specifying the correct pathway, we can read in the csv to </a:t>
+            </a:r>
+            <a:r>
+              <a:rPr lang="en-US" dirty="0" err="1"/>
+              <a:t>Rstudio</a:t>
+            </a:r>
+            <a:endParaRPr lang="en-US" dirty="0"/>
+          </a:p>
+          <a:p>
+            <a:endParaRPr lang="en-US" dirty="0"/>
+          </a:p>
+        </p:txBody>
+      </p:sp>
+      <p:cxnSp>
+        <p:nvCxnSpPr>
+          <p:cNvPr id="6" name="Straight Arrow Connector 5">
+            <a:extLst>
+              <a:ext uri="{FF2B5EF4-FFF2-40B4-BE49-F238E27FC236}">
+                <a16:creationId xmlns:a16="http://schemas.microsoft.com/office/drawing/2014/main" id="{A1313DEF-DCAA-4E44-B7DC-3036D52B7DB0}"/>
+              </a:ext>
+            </a:extLst>
+          </p:cNvPr>
+          <p:cNvCxnSpPr>
+            <a:stCxn id="4" idx="3"/>
+          </p:cNvCxnSpPr>
+          <p:nvPr/>
+        </p:nvCxnSpPr>
+        <p:spPr>
+          <a:xfrm flipV="1">
+            <a:off x="4001914" y="4233334"/>
+            <a:ext cx="457198" cy="837960"/>
+          </a:xfrm>
+          <a:prstGeom prst="straightConnector1">
+            <a:avLst/>
+          </a:prstGeom>
+          <a:ln w="19050">
+            <a:tailEnd type="triangle"/>
+          </a:ln>
+        </p:spPr>
+        <p:style>
+          <a:lnRef idx="1">
+            <a:schemeClr val="accent1"/>
+          </a:lnRef>
+          <a:fillRef idx="0">
+            <a:schemeClr val="accent1"/>
+          </a:fillRef>
+          <a:effectRef idx="0">
+            <a:schemeClr val="accent1"/>
+          </a:effectRef>
+          <a:fontRef idx="minor">
+            <a:schemeClr val="tx1"/>
+          </a:fontRef>
+        </p:style>
+      </p:cxnSp>
+      <p:sp>
+        <p:nvSpPr>
+          <p:cNvPr id="7" name="Left Brace 6">
+            <a:extLst>
+              <a:ext uri="{FF2B5EF4-FFF2-40B4-BE49-F238E27FC236}">
+                <a16:creationId xmlns:a16="http://schemas.microsoft.com/office/drawing/2014/main" id="{20E62AFE-E5C0-914C-88BB-D6A48A85E256}"/>
+              </a:ext>
+            </a:extLst>
+          </p:cNvPr>
+          <p:cNvSpPr/>
+          <p:nvPr/>
+        </p:nvSpPr>
+        <p:spPr>
+          <a:xfrm rot="16200000">
+            <a:off x="4334936" y="3064935"/>
+            <a:ext cx="270934" cy="1919107"/>
+          </a:xfrm>
+          <a:prstGeom prst="leftBrace">
+            <a:avLst/>
+          </a:prstGeom>
+          <a:ln w="19050"/>
+        </p:spPr>
+        <p:style>
+          <a:lnRef idx="1">
+            <a:schemeClr val="accent1"/>
+          </a:lnRef>
+          <a:fillRef idx="0">
+            <a:schemeClr val="accent1"/>
+          </a:fillRef>
+          <a:effectRef idx="0">
+            <a:schemeClr val="accent1"/>
+          </a:effectRef>
+          <a:fontRef idx="minor">
+            <a:schemeClr val="tx1"/>
+          </a:fontRef>
+        </p:style>
+        <p:txBody>
+          <a:bodyPr rtlCol="0" anchor="ctr"/>
+          <a:lstStyle/>
+          <a:p>
+            <a:pPr algn="ctr"/>
+            <a:endParaRPr lang="en-US"/>
+          </a:p>
+        </p:txBody>
+      </p:sp>
+    </p:spTree>
+    <p:extLst>
+      <p:ext uri="{BB962C8B-B14F-4D97-AF65-F5344CB8AC3E}">
+        <p14:creationId xmlns:p14="http://schemas.microsoft.com/office/powerpoint/2010/main" val="3440547479"/>
+      </p:ext>
+    </p:extLst>
+  </p:cSld>
+  <p:clrMapOvr>
+    <a:masterClrMapping/>
+  </p:clrMapOvr>
+</p:sld>
+</file>
+
+<file path=ppt/slides/slide14.xml><?xml version="1.0" encoding="utf-8"?>
+<p:sld xmlns:a="http://schemas.openxmlformats.org/drawingml/2006/main" xmlns:r="http://schemas.openxmlformats.org/officeDocument/2006/relationships" xmlns:p="http://schemas.openxmlformats.org/presentationml/2006/main">
+  <p:cSld>
+    <p:spTree>
+      <p:nvGrpSpPr>
+        <p:cNvPr id="1" name=""/>
+        <p:cNvGrpSpPr/>
+        <p:nvPr/>
+      </p:nvGrpSpPr>
+      <p:grpSpPr>
+        <a:xfrm>
+          <a:off x="0" y="0"/>
+          <a:ext cx="0" cy="0"/>
+          <a:chOff x="0" y="0"/>
+          <a:chExt cx="0" cy="0"/>
+        </a:xfrm>
+      </p:grpSpPr>
+      <p:pic>
+        <p:nvPicPr>
+          <p:cNvPr id="3" name="Picture 2" descr="A screenshot of a social media post&#10;&#10;Description automatically generated">
+            <a:extLst>
+              <a:ext uri="{FF2B5EF4-FFF2-40B4-BE49-F238E27FC236}">
+                <a16:creationId xmlns:a16="http://schemas.microsoft.com/office/drawing/2014/main" id="{EE61338B-7D38-C247-8C16-80F597A17EF1}"/>
+              </a:ext>
+            </a:extLst>
+          </p:cNvPr>
+          <p:cNvPicPr>
+            <a:picLocks noChangeAspect="1"/>
+          </p:cNvPicPr>
+          <p:nvPr/>
+        </p:nvPicPr>
+        <p:blipFill>
+          <a:blip r:embed="rId2"/>
+          <a:stretch>
+            <a:fillRect/>
+          </a:stretch>
+        </p:blipFill>
+        <p:spPr>
+          <a:xfrm>
+            <a:off x="834672" y="389467"/>
+            <a:ext cx="8241594" cy="4531318"/>
+          </a:xfrm>
+          <a:prstGeom prst="rect">
+            <a:avLst/>
+          </a:prstGeom>
+        </p:spPr>
+      </p:pic>
+      <p:sp>
+        <p:nvSpPr>
+          <p:cNvPr id="4" name="TextBox 3">
+            <a:extLst>
+              <a:ext uri="{FF2B5EF4-FFF2-40B4-BE49-F238E27FC236}">
+                <a16:creationId xmlns:a16="http://schemas.microsoft.com/office/drawing/2014/main" id="{B67198FC-8639-314A-A3C1-F97567917047}"/>
+              </a:ext>
+            </a:extLst>
+          </p:cNvPr>
+          <p:cNvSpPr txBox="1"/>
+          <p:nvPr/>
+        </p:nvSpPr>
+        <p:spPr>
+          <a:xfrm>
+            <a:off x="366891" y="5148462"/>
+            <a:ext cx="2139243" cy="923330"/>
+          </a:xfrm>
+          <a:prstGeom prst="rect">
+            <a:avLst/>
+          </a:prstGeom>
+          <a:solidFill>
+            <a:schemeClr val="bg2"/>
+          </a:solidFill>
+          <a:ln>
+            <a:solidFill>
+              <a:schemeClr val="accent1"/>
+            </a:solidFill>
+          </a:ln>
+        </p:spPr>
+        <p:txBody>
+          <a:bodyPr wrap="square" rtlCol="0">
+            <a:spAutoFit/>
+          </a:bodyPr>
+          <a:lstStyle/>
+          <a:p>
+            <a:r>
+              <a:rPr lang="en-US" dirty="0"/>
+              <a:t>“.” denotes working directory pathway</a:t>
+            </a:r>
+          </a:p>
+          <a:p>
+            <a:endParaRPr lang="en-US" dirty="0"/>
+          </a:p>
+        </p:txBody>
+      </p:sp>
+      <p:sp>
+        <p:nvSpPr>
+          <p:cNvPr id="5" name="TextBox 4">
+            <a:extLst>
+              <a:ext uri="{FF2B5EF4-FFF2-40B4-BE49-F238E27FC236}">
+                <a16:creationId xmlns:a16="http://schemas.microsoft.com/office/drawing/2014/main" id="{AD276142-DE03-6447-A0A2-507FC754BB43}"/>
+              </a:ext>
+            </a:extLst>
+          </p:cNvPr>
+          <p:cNvSpPr txBox="1"/>
+          <p:nvPr/>
+        </p:nvSpPr>
+        <p:spPr>
+          <a:xfrm>
+            <a:off x="4165602" y="4962194"/>
+            <a:ext cx="2139243" cy="1754326"/>
+          </a:xfrm>
+          <a:prstGeom prst="rect">
+            <a:avLst/>
+          </a:prstGeom>
+          <a:solidFill>
+            <a:schemeClr val="bg2"/>
+          </a:solidFill>
+          <a:ln>
+            <a:solidFill>
+              <a:schemeClr val="accent1"/>
+            </a:solidFill>
+          </a:ln>
+        </p:spPr>
+        <p:txBody>
+          <a:bodyPr wrap="square" rtlCol="0">
+            <a:spAutoFit/>
+          </a:bodyPr>
+          <a:lstStyle/>
+          <a:p>
+            <a:r>
+              <a:rPr lang="en-US" dirty="0"/>
+              <a:t>“/</a:t>
+            </a:r>
+            <a:r>
+              <a:rPr lang="en-US" dirty="0" err="1"/>
+              <a:t>data_raw</a:t>
+            </a:r>
+            <a:r>
+              <a:rPr lang="en-US" dirty="0"/>
+              <a:t>/my-</a:t>
+            </a:r>
+            <a:r>
+              <a:rPr lang="en-US" dirty="0" err="1"/>
+              <a:t>data.csv</a:t>
+            </a:r>
+            <a:r>
+              <a:rPr lang="en-US" dirty="0"/>
+              <a:t>” denotes additional doorway through with R must go to access the csv</a:t>
+            </a:r>
+          </a:p>
+          <a:p>
+            <a:endParaRPr lang="en-US" dirty="0"/>
+          </a:p>
+        </p:txBody>
+      </p:sp>
+      <p:cxnSp>
+        <p:nvCxnSpPr>
+          <p:cNvPr id="7" name="Straight Arrow Connector 6">
+            <a:extLst>
+              <a:ext uri="{FF2B5EF4-FFF2-40B4-BE49-F238E27FC236}">
+                <a16:creationId xmlns:a16="http://schemas.microsoft.com/office/drawing/2014/main" id="{9060CB21-3BA9-9047-90F2-830B958E4782}"/>
+              </a:ext>
+            </a:extLst>
+          </p:cNvPr>
+          <p:cNvCxnSpPr>
+            <a:stCxn id="4" idx="0"/>
+          </p:cNvCxnSpPr>
+          <p:nvPr/>
+        </p:nvCxnSpPr>
+        <p:spPr>
+          <a:xfrm flipV="1">
+            <a:off x="1436513" y="4662311"/>
+            <a:ext cx="1069620" cy="486151"/>
+          </a:xfrm>
+          <a:prstGeom prst="straightConnector1">
+            <a:avLst/>
+          </a:prstGeom>
+          <a:ln w="19050">
+            <a:tailEnd type="triangle"/>
+          </a:ln>
+        </p:spPr>
+        <p:style>
+          <a:lnRef idx="1">
+            <a:schemeClr val="accent1"/>
+          </a:lnRef>
+          <a:fillRef idx="0">
+            <a:schemeClr val="accent1"/>
+          </a:fillRef>
+          <a:effectRef idx="0">
+            <a:schemeClr val="accent1"/>
+          </a:effectRef>
+          <a:fontRef idx="minor">
+            <a:schemeClr val="tx1"/>
+          </a:fontRef>
+        </p:style>
+      </p:cxnSp>
+      <p:cxnSp>
+        <p:nvCxnSpPr>
+          <p:cNvPr id="9" name="Straight Arrow Connector 8">
+            <a:extLst>
+              <a:ext uri="{FF2B5EF4-FFF2-40B4-BE49-F238E27FC236}">
+                <a16:creationId xmlns:a16="http://schemas.microsoft.com/office/drawing/2014/main" id="{1AE6EE18-6882-8941-88EC-AB45D12CDCE0}"/>
+              </a:ext>
+            </a:extLst>
+          </p:cNvPr>
+          <p:cNvCxnSpPr>
+            <a:stCxn id="5" idx="1"/>
+          </p:cNvCxnSpPr>
+          <p:nvPr/>
+        </p:nvCxnSpPr>
+        <p:spPr>
+          <a:xfrm flipH="1" flipV="1">
+            <a:off x="3567289" y="4730044"/>
+            <a:ext cx="598313" cy="1109313"/>
+          </a:xfrm>
+          <a:prstGeom prst="straightConnector1">
+            <a:avLst/>
+          </a:prstGeom>
+          <a:ln w="19050">
+            <a:tailEnd type="triangle"/>
+          </a:ln>
+        </p:spPr>
+        <p:style>
+          <a:lnRef idx="1">
+            <a:schemeClr val="accent1"/>
+          </a:lnRef>
+          <a:fillRef idx="0">
+            <a:schemeClr val="accent1"/>
+          </a:fillRef>
+          <a:effectRef idx="0">
+            <a:schemeClr val="accent1"/>
+          </a:effectRef>
+          <a:fontRef idx="minor">
+            <a:schemeClr val="tx1"/>
+          </a:fontRef>
+        </p:style>
+      </p:cxnSp>
+    </p:spTree>
+    <p:extLst>
+      <p:ext uri="{BB962C8B-B14F-4D97-AF65-F5344CB8AC3E}">
+        <p14:creationId xmlns:p14="http://schemas.microsoft.com/office/powerpoint/2010/main" val="713424005"/>
       </p:ext>
     </p:extLst>
   </p:cSld>
@@ -5652,6 +7198,882 @@
 </p:sld>
 </file>
 
+<file path=ppt/slides/slide7.xml><?xml version="1.0" encoding="utf-8"?>
+<p:sld xmlns:a="http://schemas.openxmlformats.org/drawingml/2006/main" xmlns:r="http://schemas.openxmlformats.org/officeDocument/2006/relationships" xmlns:p="http://schemas.openxmlformats.org/presentationml/2006/main">
+  <p:cSld>
+    <p:spTree>
+      <p:nvGrpSpPr>
+        <p:cNvPr id="1" name=""/>
+        <p:cNvGrpSpPr/>
+        <p:nvPr/>
+      </p:nvGrpSpPr>
+      <p:grpSpPr>
+        <a:xfrm>
+          <a:off x="0" y="0"/>
+          <a:ext cx="0" cy="0"/>
+          <a:chOff x="0" y="0"/>
+          <a:chExt cx="0" cy="0"/>
+        </a:xfrm>
+      </p:grpSpPr>
+      <p:pic>
+        <p:nvPicPr>
+          <p:cNvPr id="7" name="Picture 6" descr="A screenshot of a cell phone&#10;&#10;Description automatically generated">
+            <a:extLst>
+              <a:ext uri="{FF2B5EF4-FFF2-40B4-BE49-F238E27FC236}">
+                <a16:creationId xmlns:a16="http://schemas.microsoft.com/office/drawing/2014/main" id="{D620454B-8899-DE4E-94DB-312A2184AA12}"/>
+              </a:ext>
+            </a:extLst>
+          </p:cNvPr>
+          <p:cNvPicPr>
+            <a:picLocks noChangeAspect="1"/>
+          </p:cNvPicPr>
+          <p:nvPr/>
+        </p:nvPicPr>
+        <p:blipFill>
+          <a:blip r:embed="rId2"/>
+          <a:stretch>
+            <a:fillRect/>
+          </a:stretch>
+        </p:blipFill>
+        <p:spPr>
+          <a:xfrm>
+            <a:off x="0" y="1383596"/>
+            <a:ext cx="5693160" cy="3662538"/>
+          </a:xfrm>
+          <a:prstGeom prst="rect">
+            <a:avLst/>
+          </a:prstGeom>
+        </p:spPr>
+      </p:pic>
+      <p:sp>
+        <p:nvSpPr>
+          <p:cNvPr id="8" name="TextBox 7">
+            <a:extLst>
+              <a:ext uri="{FF2B5EF4-FFF2-40B4-BE49-F238E27FC236}">
+                <a16:creationId xmlns:a16="http://schemas.microsoft.com/office/drawing/2014/main" id="{F3EB4324-40E6-BE44-99A5-E0E3A1A4B398}"/>
+              </a:ext>
+            </a:extLst>
+          </p:cNvPr>
+          <p:cNvSpPr txBox="1"/>
+          <p:nvPr/>
+        </p:nvSpPr>
+        <p:spPr>
+          <a:xfrm>
+            <a:off x="3127021" y="2230285"/>
+            <a:ext cx="1986845" cy="369332"/>
+          </a:xfrm>
+          <a:prstGeom prst="rect">
+            <a:avLst/>
+          </a:prstGeom>
+          <a:solidFill>
+            <a:schemeClr val="bg2"/>
+          </a:solidFill>
+          <a:ln>
+            <a:solidFill>
+              <a:schemeClr val="accent1"/>
+            </a:solidFill>
+          </a:ln>
+        </p:spPr>
+        <p:txBody>
+          <a:bodyPr wrap="square" rtlCol="0">
+            <a:spAutoFit/>
+          </a:bodyPr>
+          <a:lstStyle/>
+          <a:p>
+            <a:r>
+              <a:rPr lang="en-US" dirty="0"/>
+              <a:t>Here’s the change</a:t>
+            </a:r>
+          </a:p>
+        </p:txBody>
+      </p:sp>
+      <p:cxnSp>
+        <p:nvCxnSpPr>
+          <p:cNvPr id="10" name="Straight Arrow Connector 9">
+            <a:extLst>
+              <a:ext uri="{FF2B5EF4-FFF2-40B4-BE49-F238E27FC236}">
+                <a16:creationId xmlns:a16="http://schemas.microsoft.com/office/drawing/2014/main" id="{5D79791F-FCDE-6A4A-A540-D197F41A7174}"/>
+              </a:ext>
+            </a:extLst>
+          </p:cNvPr>
+          <p:cNvCxnSpPr>
+            <a:stCxn id="8" idx="1"/>
+          </p:cNvCxnSpPr>
+          <p:nvPr/>
+        </p:nvCxnSpPr>
+        <p:spPr>
+          <a:xfrm flipH="1">
+            <a:off x="1930400" y="2414951"/>
+            <a:ext cx="1196621" cy="102472"/>
+          </a:xfrm>
+          <a:prstGeom prst="straightConnector1">
+            <a:avLst/>
+          </a:prstGeom>
+          <a:ln w="19050">
+            <a:tailEnd type="triangle"/>
+          </a:ln>
+        </p:spPr>
+        <p:style>
+          <a:lnRef idx="1">
+            <a:schemeClr val="accent1"/>
+          </a:lnRef>
+          <a:fillRef idx="0">
+            <a:schemeClr val="accent1"/>
+          </a:fillRef>
+          <a:effectRef idx="0">
+            <a:schemeClr val="accent1"/>
+          </a:effectRef>
+          <a:fontRef idx="minor">
+            <a:schemeClr val="tx1"/>
+          </a:fontRef>
+        </p:style>
+      </p:cxnSp>
+      <p:pic>
+        <p:nvPicPr>
+          <p:cNvPr id="12" name="Picture 11" descr="A screenshot of a social media post&#10;&#10;Description automatically generated">
+            <a:extLst>
+              <a:ext uri="{FF2B5EF4-FFF2-40B4-BE49-F238E27FC236}">
+                <a16:creationId xmlns:a16="http://schemas.microsoft.com/office/drawing/2014/main" id="{96C2B1F3-4B9C-9443-9737-0EF878A5E179}"/>
+              </a:ext>
+            </a:extLst>
+          </p:cNvPr>
+          <p:cNvPicPr>
+            <a:picLocks noChangeAspect="1"/>
+          </p:cNvPicPr>
+          <p:nvPr/>
+        </p:nvPicPr>
+        <p:blipFill>
+          <a:blip r:embed="rId3"/>
+          <a:stretch>
+            <a:fillRect/>
+          </a:stretch>
+        </p:blipFill>
+        <p:spPr>
+          <a:xfrm>
+            <a:off x="6231466" y="1377245"/>
+            <a:ext cx="5765632" cy="3707143"/>
+          </a:xfrm>
+          <a:prstGeom prst="rect">
+            <a:avLst/>
+          </a:prstGeom>
+        </p:spPr>
+      </p:pic>
+      <p:sp>
+        <p:nvSpPr>
+          <p:cNvPr id="13" name="Right Arrow 12">
+            <a:extLst>
+              <a:ext uri="{FF2B5EF4-FFF2-40B4-BE49-F238E27FC236}">
+                <a16:creationId xmlns:a16="http://schemas.microsoft.com/office/drawing/2014/main" id="{56AC5A9B-FDEB-7546-9D3B-41BC8B3097F2}"/>
+              </a:ext>
+            </a:extLst>
+          </p:cNvPr>
+          <p:cNvSpPr/>
+          <p:nvPr/>
+        </p:nvSpPr>
+        <p:spPr>
+          <a:xfrm>
+            <a:off x="5723467" y="3104444"/>
+            <a:ext cx="508000" cy="248356"/>
+          </a:xfrm>
+          <a:prstGeom prst="rightArrow">
+            <a:avLst/>
+          </a:prstGeom>
+        </p:spPr>
+        <p:style>
+          <a:lnRef idx="2">
+            <a:schemeClr val="accent1">
+              <a:shade val="50000"/>
+            </a:schemeClr>
+          </a:lnRef>
+          <a:fillRef idx="1">
+            <a:schemeClr val="accent1"/>
+          </a:fillRef>
+          <a:effectRef idx="0">
+            <a:schemeClr val="accent1"/>
+          </a:effectRef>
+          <a:fontRef idx="minor">
+            <a:schemeClr val="lt1"/>
+          </a:fontRef>
+        </p:style>
+        <p:txBody>
+          <a:bodyPr rtlCol="0" anchor="ctr"/>
+          <a:lstStyle/>
+          <a:p>
+            <a:pPr algn="ctr"/>
+            <a:endParaRPr lang="en-US"/>
+          </a:p>
+        </p:txBody>
+      </p:sp>
+      <p:sp>
+        <p:nvSpPr>
+          <p:cNvPr id="14" name="TextBox 13">
+            <a:extLst>
+              <a:ext uri="{FF2B5EF4-FFF2-40B4-BE49-F238E27FC236}">
+                <a16:creationId xmlns:a16="http://schemas.microsoft.com/office/drawing/2014/main" id="{D056D9E4-F053-D546-93D5-4F1BA520DC6A}"/>
+              </a:ext>
+            </a:extLst>
+          </p:cNvPr>
+          <p:cNvSpPr txBox="1"/>
+          <p:nvPr/>
+        </p:nvSpPr>
+        <p:spPr>
+          <a:xfrm>
+            <a:off x="8731955" y="2021441"/>
+            <a:ext cx="1450624" cy="369332"/>
+          </a:xfrm>
+          <a:prstGeom prst="rect">
+            <a:avLst/>
+          </a:prstGeom>
+          <a:solidFill>
+            <a:schemeClr val="bg2"/>
+          </a:solidFill>
+          <a:ln>
+            <a:solidFill>
+              <a:schemeClr val="accent1"/>
+            </a:solidFill>
+          </a:ln>
+        </p:spPr>
+        <p:txBody>
+          <a:bodyPr wrap="square" rtlCol="0">
+            <a:spAutoFit/>
+          </a:bodyPr>
+          <a:lstStyle/>
+          <a:p>
+            <a:r>
+              <a:rPr lang="en-US" dirty="0"/>
+              <a:t>Click Commit</a:t>
+            </a:r>
+          </a:p>
+        </p:txBody>
+      </p:sp>
+      <p:cxnSp>
+        <p:nvCxnSpPr>
+          <p:cNvPr id="15" name="Straight Arrow Connector 14">
+            <a:extLst>
+              <a:ext uri="{FF2B5EF4-FFF2-40B4-BE49-F238E27FC236}">
+                <a16:creationId xmlns:a16="http://schemas.microsoft.com/office/drawing/2014/main" id="{978B646F-A721-3441-8B92-7800CF16AF31}"/>
+              </a:ext>
+            </a:extLst>
+          </p:cNvPr>
+          <p:cNvCxnSpPr>
+            <a:cxnSpLocks/>
+            <a:stCxn id="14" idx="1"/>
+          </p:cNvCxnSpPr>
+          <p:nvPr/>
+        </p:nvCxnSpPr>
+        <p:spPr>
+          <a:xfrm flipH="1" flipV="1">
+            <a:off x="7631289" y="1840089"/>
+            <a:ext cx="1100666" cy="366018"/>
+          </a:xfrm>
+          <a:prstGeom prst="straightConnector1">
+            <a:avLst/>
+          </a:prstGeom>
+          <a:ln w="19050">
+            <a:tailEnd type="triangle"/>
+          </a:ln>
+        </p:spPr>
+        <p:style>
+          <a:lnRef idx="1">
+            <a:schemeClr val="accent1"/>
+          </a:lnRef>
+          <a:fillRef idx="0">
+            <a:schemeClr val="accent1"/>
+          </a:fillRef>
+          <a:effectRef idx="0">
+            <a:schemeClr val="accent1"/>
+          </a:effectRef>
+          <a:fontRef idx="minor">
+            <a:schemeClr val="tx1"/>
+          </a:fontRef>
+        </p:style>
+      </p:cxnSp>
+    </p:spTree>
+    <p:extLst>
+      <p:ext uri="{BB962C8B-B14F-4D97-AF65-F5344CB8AC3E}">
+        <p14:creationId xmlns:p14="http://schemas.microsoft.com/office/powerpoint/2010/main" val="3086064753"/>
+      </p:ext>
+    </p:extLst>
+  </p:cSld>
+  <p:clrMapOvr>
+    <a:masterClrMapping/>
+  </p:clrMapOvr>
+</p:sld>
+</file>
+
+<file path=ppt/slides/slide8.xml><?xml version="1.0" encoding="utf-8"?>
+<p:sld xmlns:a="http://schemas.openxmlformats.org/drawingml/2006/main" xmlns:r="http://schemas.openxmlformats.org/officeDocument/2006/relationships" xmlns:p="http://schemas.openxmlformats.org/presentationml/2006/main">
+  <p:cSld>
+    <p:spTree>
+      <p:nvGrpSpPr>
+        <p:cNvPr id="1" name=""/>
+        <p:cNvGrpSpPr/>
+        <p:nvPr/>
+      </p:nvGrpSpPr>
+      <p:grpSpPr>
+        <a:xfrm>
+          <a:off x="0" y="0"/>
+          <a:ext cx="0" cy="0"/>
+          <a:chOff x="0" y="0"/>
+          <a:chExt cx="0" cy="0"/>
+        </a:xfrm>
+      </p:grpSpPr>
+      <p:pic>
+        <p:nvPicPr>
+          <p:cNvPr id="5" name="Picture 4" descr="A screenshot of a social media post&#10;&#10;Description automatically generated">
+            <a:extLst>
+              <a:ext uri="{FF2B5EF4-FFF2-40B4-BE49-F238E27FC236}">
+                <a16:creationId xmlns:a16="http://schemas.microsoft.com/office/drawing/2014/main" id="{A8941161-3B24-814B-BFF5-C5AFCD2E766D}"/>
+              </a:ext>
+            </a:extLst>
+          </p:cNvPr>
+          <p:cNvPicPr>
+            <a:picLocks noChangeAspect="1"/>
+          </p:cNvPicPr>
+          <p:nvPr/>
+        </p:nvPicPr>
+        <p:blipFill rotWithShape="1">
+          <a:blip r:embed="rId2"/>
+          <a:srcRect b="50947"/>
+          <a:stretch/>
+        </p:blipFill>
+        <p:spPr>
+          <a:xfrm>
+            <a:off x="0" y="0"/>
+            <a:ext cx="12192000" cy="3364089"/>
+          </a:xfrm>
+          <a:prstGeom prst="rect">
+            <a:avLst/>
+          </a:prstGeom>
+        </p:spPr>
+      </p:pic>
+      <p:sp>
+        <p:nvSpPr>
+          <p:cNvPr id="6" name="TextBox 5">
+            <a:extLst>
+              <a:ext uri="{FF2B5EF4-FFF2-40B4-BE49-F238E27FC236}">
+                <a16:creationId xmlns:a16="http://schemas.microsoft.com/office/drawing/2014/main" id="{23A4D1D2-061E-D949-A43F-80B6BBDB6921}"/>
+              </a:ext>
+            </a:extLst>
+          </p:cNvPr>
+          <p:cNvSpPr txBox="1"/>
+          <p:nvPr/>
+        </p:nvSpPr>
+        <p:spPr>
+          <a:xfrm>
+            <a:off x="3431821" y="390196"/>
+            <a:ext cx="1986845" cy="923330"/>
+          </a:xfrm>
+          <a:prstGeom prst="rect">
+            <a:avLst/>
+          </a:prstGeom>
+          <a:solidFill>
+            <a:schemeClr val="bg2"/>
+          </a:solidFill>
+          <a:ln>
+            <a:solidFill>
+              <a:schemeClr val="accent1"/>
+            </a:solidFill>
+          </a:ln>
+        </p:spPr>
+        <p:txBody>
+          <a:bodyPr wrap="square" rtlCol="0">
+            <a:spAutoFit/>
+          </a:bodyPr>
+          <a:lstStyle/>
+          <a:p>
+            <a:r>
+              <a:rPr lang="en-US" dirty="0"/>
+              <a:t>A new window opens outlining your changes</a:t>
+            </a:r>
+          </a:p>
+        </p:txBody>
+      </p:sp>
+      <p:sp>
+        <p:nvSpPr>
+          <p:cNvPr id="7" name="TextBox 6">
+            <a:extLst>
+              <a:ext uri="{FF2B5EF4-FFF2-40B4-BE49-F238E27FC236}">
+                <a16:creationId xmlns:a16="http://schemas.microsoft.com/office/drawing/2014/main" id="{6D371DBC-8407-CA4D-9F41-50FD14ABB8C4}"/>
+              </a:ext>
+            </a:extLst>
+          </p:cNvPr>
+          <p:cNvSpPr txBox="1"/>
+          <p:nvPr/>
+        </p:nvSpPr>
+        <p:spPr>
+          <a:xfrm>
+            <a:off x="7072489" y="903839"/>
+            <a:ext cx="2094089" cy="923330"/>
+          </a:xfrm>
+          <a:prstGeom prst="rect">
+            <a:avLst/>
+          </a:prstGeom>
+          <a:solidFill>
+            <a:schemeClr val="bg2"/>
+          </a:solidFill>
+          <a:ln>
+            <a:solidFill>
+              <a:schemeClr val="accent1"/>
+            </a:solidFill>
+          </a:ln>
+        </p:spPr>
+        <p:txBody>
+          <a:bodyPr wrap="square" rtlCol="0">
+            <a:spAutoFit/>
+          </a:bodyPr>
+          <a:lstStyle/>
+          <a:p>
+            <a:r>
+              <a:rPr lang="en-US" dirty="0"/>
+              <a:t>Write a commit message. </a:t>
+            </a:r>
+          </a:p>
+          <a:p>
+            <a:r>
+              <a:rPr lang="en-US" dirty="0"/>
+              <a:t>(WHY, not WHAT)</a:t>
+            </a:r>
+          </a:p>
+        </p:txBody>
+      </p:sp>
+      <p:cxnSp>
+        <p:nvCxnSpPr>
+          <p:cNvPr id="9" name="Straight Arrow Connector 8">
+            <a:extLst>
+              <a:ext uri="{FF2B5EF4-FFF2-40B4-BE49-F238E27FC236}">
+                <a16:creationId xmlns:a16="http://schemas.microsoft.com/office/drawing/2014/main" id="{26D68FE4-99E0-374B-9313-F321B96FE779}"/>
+              </a:ext>
+            </a:extLst>
+          </p:cNvPr>
+          <p:cNvCxnSpPr>
+            <a:stCxn id="7" idx="3"/>
+          </p:cNvCxnSpPr>
+          <p:nvPr/>
+        </p:nvCxnSpPr>
+        <p:spPr>
+          <a:xfrm flipV="1">
+            <a:off x="9166578" y="880533"/>
+            <a:ext cx="778933" cy="484971"/>
+          </a:xfrm>
+          <a:prstGeom prst="straightConnector1">
+            <a:avLst/>
+          </a:prstGeom>
+          <a:ln w="12700">
+            <a:tailEnd type="triangle"/>
+          </a:ln>
+        </p:spPr>
+        <p:style>
+          <a:lnRef idx="1">
+            <a:schemeClr val="accent1"/>
+          </a:lnRef>
+          <a:fillRef idx="0">
+            <a:schemeClr val="accent1"/>
+          </a:fillRef>
+          <a:effectRef idx="0">
+            <a:schemeClr val="accent1"/>
+          </a:effectRef>
+          <a:fontRef idx="minor">
+            <a:schemeClr val="tx1"/>
+          </a:fontRef>
+        </p:style>
+      </p:cxnSp>
+      <p:sp>
+        <p:nvSpPr>
+          <p:cNvPr id="10" name="Rectangle 9">
+            <a:extLst>
+              <a:ext uri="{FF2B5EF4-FFF2-40B4-BE49-F238E27FC236}">
+                <a16:creationId xmlns:a16="http://schemas.microsoft.com/office/drawing/2014/main" id="{5DD05782-B282-154A-A6C9-E1611E6F246C}"/>
+              </a:ext>
+            </a:extLst>
+          </p:cNvPr>
+          <p:cNvSpPr/>
+          <p:nvPr/>
+        </p:nvSpPr>
+        <p:spPr>
+          <a:xfrm>
+            <a:off x="11548533" y="1219200"/>
+            <a:ext cx="643467" cy="564444"/>
+          </a:xfrm>
+          <a:prstGeom prst="rect">
+            <a:avLst/>
+          </a:prstGeom>
+          <a:noFill/>
+          <a:ln w="28575"/>
+        </p:spPr>
+        <p:style>
+          <a:lnRef idx="2">
+            <a:schemeClr val="accent1">
+              <a:shade val="50000"/>
+            </a:schemeClr>
+          </a:lnRef>
+          <a:fillRef idx="1">
+            <a:schemeClr val="accent1"/>
+          </a:fillRef>
+          <a:effectRef idx="0">
+            <a:schemeClr val="accent1"/>
+          </a:effectRef>
+          <a:fontRef idx="minor">
+            <a:schemeClr val="lt1"/>
+          </a:fontRef>
+        </p:style>
+        <p:txBody>
+          <a:bodyPr rtlCol="0" anchor="ctr"/>
+          <a:lstStyle/>
+          <a:p>
+            <a:pPr algn="ctr"/>
+            <a:endParaRPr lang="en-US"/>
+          </a:p>
+        </p:txBody>
+      </p:sp>
+      <p:pic>
+        <p:nvPicPr>
+          <p:cNvPr id="12" name="Picture 11" descr="A screenshot of a cell phone&#10;&#10;Description automatically generated">
+            <a:extLst>
+              <a:ext uri="{FF2B5EF4-FFF2-40B4-BE49-F238E27FC236}">
+                <a16:creationId xmlns:a16="http://schemas.microsoft.com/office/drawing/2014/main" id="{D6C2797B-DC1F-E948-92C9-6A935DA62AD1}"/>
+              </a:ext>
+            </a:extLst>
+          </p:cNvPr>
+          <p:cNvPicPr>
+            <a:picLocks noChangeAspect="1"/>
+          </p:cNvPicPr>
+          <p:nvPr/>
+        </p:nvPicPr>
+        <p:blipFill>
+          <a:blip r:embed="rId3"/>
+          <a:stretch>
+            <a:fillRect/>
+          </a:stretch>
+        </p:blipFill>
+        <p:spPr>
+          <a:xfrm>
+            <a:off x="2756606" y="3585865"/>
+            <a:ext cx="6884106" cy="3272135"/>
+          </a:xfrm>
+          <a:prstGeom prst="rect">
+            <a:avLst/>
+          </a:prstGeom>
+        </p:spPr>
+      </p:pic>
+      <p:sp>
+        <p:nvSpPr>
+          <p:cNvPr id="13" name="TextBox 12">
+            <a:extLst>
+              <a:ext uri="{FF2B5EF4-FFF2-40B4-BE49-F238E27FC236}">
+                <a16:creationId xmlns:a16="http://schemas.microsoft.com/office/drawing/2014/main" id="{C2D3DD3F-10B8-7841-9645-B5666A089FA7}"/>
+              </a:ext>
+            </a:extLst>
+          </p:cNvPr>
+          <p:cNvSpPr txBox="1"/>
+          <p:nvPr/>
+        </p:nvSpPr>
+        <p:spPr>
+          <a:xfrm>
+            <a:off x="1518354" y="5103307"/>
+            <a:ext cx="1986845" cy="923330"/>
+          </a:xfrm>
+          <a:prstGeom prst="rect">
+            <a:avLst/>
+          </a:prstGeom>
+          <a:solidFill>
+            <a:schemeClr val="bg2"/>
+          </a:solidFill>
+          <a:ln>
+            <a:solidFill>
+              <a:schemeClr val="accent1"/>
+            </a:solidFill>
+          </a:ln>
+        </p:spPr>
+        <p:txBody>
+          <a:bodyPr wrap="square" rtlCol="0">
+            <a:spAutoFit/>
+          </a:bodyPr>
+          <a:lstStyle/>
+          <a:p>
+            <a:r>
+              <a:rPr lang="en-US" dirty="0"/>
+              <a:t>Dialogue summarizes changes</a:t>
+            </a:r>
+          </a:p>
+        </p:txBody>
+      </p:sp>
+      <p:sp>
+        <p:nvSpPr>
+          <p:cNvPr id="14" name="Down Arrow 13">
+            <a:extLst>
+              <a:ext uri="{FF2B5EF4-FFF2-40B4-BE49-F238E27FC236}">
+                <a16:creationId xmlns:a16="http://schemas.microsoft.com/office/drawing/2014/main" id="{D44BF2FC-034A-9A49-8CF1-1C471E089BEA}"/>
+              </a:ext>
+            </a:extLst>
+          </p:cNvPr>
+          <p:cNvSpPr/>
+          <p:nvPr/>
+        </p:nvSpPr>
+        <p:spPr>
+          <a:xfrm>
+            <a:off x="5678311" y="2946400"/>
+            <a:ext cx="338667" cy="643466"/>
+          </a:xfrm>
+          <a:prstGeom prst="downArrow">
+            <a:avLst/>
+          </a:prstGeom>
+        </p:spPr>
+        <p:style>
+          <a:lnRef idx="2">
+            <a:schemeClr val="accent1">
+              <a:shade val="50000"/>
+            </a:schemeClr>
+          </a:lnRef>
+          <a:fillRef idx="1">
+            <a:schemeClr val="accent1"/>
+          </a:fillRef>
+          <a:effectRef idx="0">
+            <a:schemeClr val="accent1"/>
+          </a:effectRef>
+          <a:fontRef idx="minor">
+            <a:schemeClr val="lt1"/>
+          </a:fontRef>
+        </p:style>
+        <p:txBody>
+          <a:bodyPr rtlCol="0" anchor="ctr"/>
+          <a:lstStyle/>
+          <a:p>
+            <a:pPr algn="ctr"/>
+            <a:endParaRPr lang="en-US"/>
+          </a:p>
+        </p:txBody>
+      </p:sp>
+    </p:spTree>
+    <p:extLst>
+      <p:ext uri="{BB962C8B-B14F-4D97-AF65-F5344CB8AC3E}">
+        <p14:creationId xmlns:p14="http://schemas.microsoft.com/office/powerpoint/2010/main" val="648466032"/>
+      </p:ext>
+    </p:extLst>
+  </p:cSld>
+  <p:clrMapOvr>
+    <a:masterClrMapping/>
+  </p:clrMapOvr>
+</p:sld>
+</file>
+
+<file path=ppt/slides/slide9.xml><?xml version="1.0" encoding="utf-8"?>
+<p:sld xmlns:a="http://schemas.openxmlformats.org/drawingml/2006/main" xmlns:r="http://schemas.openxmlformats.org/officeDocument/2006/relationships" xmlns:p="http://schemas.openxmlformats.org/presentationml/2006/main">
+  <p:cSld>
+    <p:spTree>
+      <p:nvGrpSpPr>
+        <p:cNvPr id="1" name=""/>
+        <p:cNvGrpSpPr/>
+        <p:nvPr/>
+      </p:nvGrpSpPr>
+      <p:grpSpPr>
+        <a:xfrm>
+          <a:off x="0" y="0"/>
+          <a:ext cx="0" cy="0"/>
+          <a:chOff x="0" y="0"/>
+          <a:chExt cx="0" cy="0"/>
+        </a:xfrm>
+      </p:grpSpPr>
+      <p:pic>
+        <p:nvPicPr>
+          <p:cNvPr id="3" name="Picture 2" descr="A screenshot of a social media post&#10;&#10;Description automatically generated">
+            <a:extLst>
+              <a:ext uri="{FF2B5EF4-FFF2-40B4-BE49-F238E27FC236}">
+                <a16:creationId xmlns:a16="http://schemas.microsoft.com/office/drawing/2014/main" id="{5FBF57CD-FE3F-434D-8860-8D8246F8118A}"/>
+              </a:ext>
+            </a:extLst>
+          </p:cNvPr>
+          <p:cNvPicPr>
+            <a:picLocks noChangeAspect="1"/>
+          </p:cNvPicPr>
+          <p:nvPr/>
+        </p:nvPicPr>
+        <p:blipFill>
+          <a:blip r:embed="rId2"/>
+          <a:stretch>
+            <a:fillRect/>
+          </a:stretch>
+        </p:blipFill>
+        <p:spPr>
+          <a:xfrm>
+            <a:off x="0" y="0"/>
+            <a:ext cx="12192000" cy="6858000"/>
+          </a:xfrm>
+          <a:prstGeom prst="rect">
+            <a:avLst/>
+          </a:prstGeom>
+        </p:spPr>
+      </p:pic>
+      <p:sp>
+        <p:nvSpPr>
+          <p:cNvPr id="4" name="TextBox 3">
+            <a:extLst>
+              <a:ext uri="{FF2B5EF4-FFF2-40B4-BE49-F238E27FC236}">
+                <a16:creationId xmlns:a16="http://schemas.microsoft.com/office/drawing/2014/main" id="{79CCEE1D-A883-494A-9832-003945FD176D}"/>
+              </a:ext>
+            </a:extLst>
+          </p:cNvPr>
+          <p:cNvSpPr txBox="1"/>
+          <p:nvPr/>
+        </p:nvSpPr>
+        <p:spPr>
+          <a:xfrm>
+            <a:off x="7789332" y="1011085"/>
+            <a:ext cx="1986845" cy="584775"/>
+          </a:xfrm>
+          <a:prstGeom prst="rect">
+            <a:avLst/>
+          </a:prstGeom>
+          <a:solidFill>
+            <a:schemeClr val="bg2"/>
+          </a:solidFill>
+          <a:ln>
+            <a:solidFill>
+              <a:schemeClr val="accent1"/>
+            </a:solidFill>
+          </a:ln>
+        </p:spPr>
+        <p:txBody>
+          <a:bodyPr wrap="square" rtlCol="0">
+            <a:spAutoFit/>
+          </a:bodyPr>
+          <a:lstStyle/>
+          <a:p>
+            <a:r>
+              <a:rPr lang="en-US" sz="1600" dirty="0"/>
+              <a:t>Now you need to “push” the commit</a:t>
+            </a:r>
+          </a:p>
+        </p:txBody>
+      </p:sp>
+      <p:cxnSp>
+        <p:nvCxnSpPr>
+          <p:cNvPr id="6" name="Straight Arrow Connector 5">
+            <a:extLst>
+              <a:ext uri="{FF2B5EF4-FFF2-40B4-BE49-F238E27FC236}">
+                <a16:creationId xmlns:a16="http://schemas.microsoft.com/office/drawing/2014/main" id="{9E8D7ACC-3771-874C-895A-8B8A42CFE92A}"/>
+              </a:ext>
+            </a:extLst>
+          </p:cNvPr>
+          <p:cNvCxnSpPr/>
+          <p:nvPr/>
+        </p:nvCxnSpPr>
+        <p:spPr>
+          <a:xfrm flipV="1">
+            <a:off x="9798756" y="214489"/>
+            <a:ext cx="1998133" cy="1128889"/>
+          </a:xfrm>
+          <a:prstGeom prst="straightConnector1">
+            <a:avLst/>
+          </a:prstGeom>
+          <a:ln w="19050">
+            <a:tailEnd type="triangle"/>
+          </a:ln>
+        </p:spPr>
+        <p:style>
+          <a:lnRef idx="1">
+            <a:schemeClr val="accent1"/>
+          </a:lnRef>
+          <a:fillRef idx="0">
+            <a:schemeClr val="accent1"/>
+          </a:fillRef>
+          <a:effectRef idx="0">
+            <a:schemeClr val="accent1"/>
+          </a:effectRef>
+          <a:fontRef idx="minor">
+            <a:schemeClr val="tx1"/>
+          </a:fontRef>
+        </p:style>
+      </p:cxnSp>
+      <p:sp>
+        <p:nvSpPr>
+          <p:cNvPr id="7" name="Down Arrow 6">
+            <a:extLst>
+              <a:ext uri="{FF2B5EF4-FFF2-40B4-BE49-F238E27FC236}">
+                <a16:creationId xmlns:a16="http://schemas.microsoft.com/office/drawing/2014/main" id="{A8294B84-F2B6-F64C-BA0C-43704B805581}"/>
+              </a:ext>
+            </a:extLst>
+          </p:cNvPr>
+          <p:cNvSpPr/>
+          <p:nvPr/>
+        </p:nvSpPr>
+        <p:spPr>
+          <a:xfrm>
+            <a:off x="5836356" y="1964267"/>
+            <a:ext cx="395111" cy="790222"/>
+          </a:xfrm>
+          <a:prstGeom prst="downArrow">
+            <a:avLst/>
+          </a:prstGeom>
+        </p:spPr>
+        <p:style>
+          <a:lnRef idx="2">
+            <a:schemeClr val="accent1">
+              <a:shade val="50000"/>
+            </a:schemeClr>
+          </a:lnRef>
+          <a:fillRef idx="1">
+            <a:schemeClr val="accent1"/>
+          </a:fillRef>
+          <a:effectRef idx="0">
+            <a:schemeClr val="accent1"/>
+          </a:effectRef>
+          <a:fontRef idx="minor">
+            <a:schemeClr val="lt1"/>
+          </a:fontRef>
+        </p:style>
+        <p:txBody>
+          <a:bodyPr rtlCol="0" anchor="ctr"/>
+          <a:lstStyle/>
+          <a:p>
+            <a:pPr algn="ctr"/>
+            <a:endParaRPr lang="en-US"/>
+          </a:p>
+        </p:txBody>
+      </p:sp>
+      <p:pic>
+        <p:nvPicPr>
+          <p:cNvPr id="9" name="Picture 8" descr="A screenshot of a cell phone&#10;&#10;Description automatically generated">
+            <a:extLst>
+              <a:ext uri="{FF2B5EF4-FFF2-40B4-BE49-F238E27FC236}">
+                <a16:creationId xmlns:a16="http://schemas.microsoft.com/office/drawing/2014/main" id="{4BAF8B02-A569-2547-9A8E-22245D4B0CDB}"/>
+              </a:ext>
+            </a:extLst>
+          </p:cNvPr>
+          <p:cNvPicPr>
+            <a:picLocks noChangeAspect="1"/>
+          </p:cNvPicPr>
+          <p:nvPr/>
+        </p:nvPicPr>
+        <p:blipFill>
+          <a:blip r:embed="rId3"/>
+          <a:stretch>
+            <a:fillRect/>
+          </a:stretch>
+        </p:blipFill>
+        <p:spPr>
+          <a:xfrm>
+            <a:off x="2369256" y="2991555"/>
+            <a:ext cx="7674609" cy="3685117"/>
+          </a:xfrm>
+          <a:prstGeom prst="rect">
+            <a:avLst/>
+          </a:prstGeom>
+        </p:spPr>
+      </p:pic>
+    </p:spTree>
+    <p:extLst>
+      <p:ext uri="{BB962C8B-B14F-4D97-AF65-F5344CB8AC3E}">
+        <p14:creationId xmlns:p14="http://schemas.microsoft.com/office/powerpoint/2010/main" val="2492948532"/>
+      </p:ext>
+    </p:extLst>
+  </p:cSld>
+  <p:clrMapOvr>
+    <a:masterClrMapping/>
+  </p:clrMapOvr>
+</p:sld>
+</file>
+
 <file path=ppt/theme/theme1.xml><?xml version="1.0" encoding="utf-8"?>
 <a:theme xmlns:a="http://schemas.openxmlformats.org/drawingml/2006/main" name="Office Theme">
   <a:themeElements>

</xml_diff>